<commit_message>
questions and doubts about the problem: deep learning on small datasets
</commit_message>
<xml_diff>
--- a/draft/presentation_draft.pptx
+++ b/draft/presentation_draft.pptx
@@ -22,9 +22,9 @@
     <p:sldId id="273" r:id="rId16"/>
     <p:sldId id="274" r:id="rId17"/>
     <p:sldId id="275" r:id="rId18"/>
-    <p:sldId id="262" r:id="rId19"/>
-    <p:sldId id="263" r:id="rId20"/>
-    <p:sldId id="264" r:id="rId21"/>
+    <p:sldId id="276" r:id="rId19"/>
+    <p:sldId id="262" r:id="rId20"/>
+    <p:sldId id="263" r:id="rId21"/>
   </p:sldIdLst>
   <p:sldSz cx="12192000" cy="6858000"/>
   <p:notesSz cx="6858000" cy="9144000"/>
@@ -278,7 +278,7 @@
           <a:p>
             <a:fld id="{D5F65742-485F-AF4F-A10E-2A244E8B6659}" type="datetimeFigureOut">
               <a:rPr lang="en-US" smtClean="0"/>
-              <a:t>3/9/19</a:t>
+              <a:t>3/10/19</a:t>
             </a:fld>
             <a:endParaRPr lang="en-US"/>
           </a:p>
@@ -476,7 +476,7 @@
           <a:p>
             <a:fld id="{D5F65742-485F-AF4F-A10E-2A244E8B6659}" type="datetimeFigureOut">
               <a:rPr lang="en-US" smtClean="0"/>
-              <a:t>3/9/19</a:t>
+              <a:t>3/10/19</a:t>
             </a:fld>
             <a:endParaRPr lang="en-US"/>
           </a:p>
@@ -684,7 +684,7 @@
           <a:p>
             <a:fld id="{D5F65742-485F-AF4F-A10E-2A244E8B6659}" type="datetimeFigureOut">
               <a:rPr lang="en-US" smtClean="0"/>
-              <a:t>3/9/19</a:t>
+              <a:t>3/10/19</a:t>
             </a:fld>
             <a:endParaRPr lang="en-US"/>
           </a:p>
@@ -882,7 +882,7 @@
           <a:p>
             <a:fld id="{D5F65742-485F-AF4F-A10E-2A244E8B6659}" type="datetimeFigureOut">
               <a:rPr lang="en-US" smtClean="0"/>
-              <a:t>3/9/19</a:t>
+              <a:t>3/10/19</a:t>
             </a:fld>
             <a:endParaRPr lang="en-US"/>
           </a:p>
@@ -1157,7 +1157,7 @@
           <a:p>
             <a:fld id="{D5F65742-485F-AF4F-A10E-2A244E8B6659}" type="datetimeFigureOut">
               <a:rPr lang="en-US" smtClean="0"/>
-              <a:t>3/9/19</a:t>
+              <a:t>3/10/19</a:t>
             </a:fld>
             <a:endParaRPr lang="en-US"/>
           </a:p>
@@ -1422,7 +1422,7 @@
           <a:p>
             <a:fld id="{D5F65742-485F-AF4F-A10E-2A244E8B6659}" type="datetimeFigureOut">
               <a:rPr lang="en-US" smtClean="0"/>
-              <a:t>3/9/19</a:t>
+              <a:t>3/10/19</a:t>
             </a:fld>
             <a:endParaRPr lang="en-US"/>
           </a:p>
@@ -1834,7 +1834,7 @@
           <a:p>
             <a:fld id="{D5F65742-485F-AF4F-A10E-2A244E8B6659}" type="datetimeFigureOut">
               <a:rPr lang="en-US" smtClean="0"/>
-              <a:t>3/9/19</a:t>
+              <a:t>3/10/19</a:t>
             </a:fld>
             <a:endParaRPr lang="en-US"/>
           </a:p>
@@ -1975,7 +1975,7 @@
           <a:p>
             <a:fld id="{D5F65742-485F-AF4F-A10E-2A244E8B6659}" type="datetimeFigureOut">
               <a:rPr lang="en-US" smtClean="0"/>
-              <a:t>3/9/19</a:t>
+              <a:t>3/10/19</a:t>
             </a:fld>
             <a:endParaRPr lang="en-US"/>
           </a:p>
@@ -2088,7 +2088,7 @@
           <a:p>
             <a:fld id="{D5F65742-485F-AF4F-A10E-2A244E8B6659}" type="datetimeFigureOut">
               <a:rPr lang="en-US" smtClean="0"/>
-              <a:t>3/9/19</a:t>
+              <a:t>3/10/19</a:t>
             </a:fld>
             <a:endParaRPr lang="en-US"/>
           </a:p>
@@ -2399,7 +2399,7 @@
           <a:p>
             <a:fld id="{D5F65742-485F-AF4F-A10E-2A244E8B6659}" type="datetimeFigureOut">
               <a:rPr lang="en-US" smtClean="0"/>
-              <a:t>3/9/19</a:t>
+              <a:t>3/10/19</a:t>
             </a:fld>
             <a:endParaRPr lang="en-US"/>
           </a:p>
@@ -2687,7 +2687,7 @@
           <a:p>
             <a:fld id="{D5F65742-485F-AF4F-A10E-2A244E8B6659}" type="datetimeFigureOut">
               <a:rPr lang="en-US" smtClean="0"/>
-              <a:t>3/9/19</a:t>
+              <a:t>3/10/19</a:t>
             </a:fld>
             <a:endParaRPr lang="en-US"/>
           </a:p>
@@ -2928,7 +2928,7 @@
           <a:p>
             <a:fld id="{D5F65742-485F-AF4F-A10E-2A244E8B6659}" type="datetimeFigureOut">
               <a:rPr lang="en-US" smtClean="0"/>
-              <a:t>3/9/19</a:t>
+              <a:t>3/10/19</a:t>
             </a:fld>
             <a:endParaRPr lang="en-US"/>
           </a:p>
@@ -6442,28 +6442,82 @@
         </p:nvSpPr>
         <p:spPr/>
         <p:txBody>
-          <a:bodyPr/>
+          <a:bodyPr>
+            <a:normAutofit fontScale="90000"/>
+          </a:bodyPr>
           <a:lstStyle/>
           <a:p>
             <a:r>
-              <a:rPr lang="en-US" dirty="0"/>
-              <a:t>Taxa de </a:t>
-            </a:r>
-            <a:r>
-              <a:rPr lang="en-US" dirty="0" err="1"/>
-              <a:t>precisão</a:t>
-            </a:r>
-            <a:r>
-              <a:rPr lang="en-US" dirty="0"/>
-              <a:t> e overfitting </a:t>
-            </a:r>
-            <a:r>
-              <a:rPr lang="en-US" dirty="0" err="1"/>
-              <a:t>em</a:t>
-            </a:r>
-            <a:r>
-              <a:rPr lang="en-US" dirty="0"/>
-              <a:t> small dataset</a:t>
+              <a:rPr lang="en-US" dirty="0" err="1"/>
+              <a:t>Algumas</a:t>
+            </a:r>
+            <a:r>
+              <a:rPr lang="en-US" dirty="0"/>
+              <a:t> </a:t>
+            </a:r>
+            <a:r>
+              <a:rPr lang="en-US" dirty="0" err="1"/>
+              <a:t>observações</a:t>
+            </a:r>
+            <a:r>
+              <a:rPr lang="en-US" dirty="0"/>
+              <a:t> </a:t>
+            </a:r>
+            <a:r>
+              <a:rPr lang="en-US" dirty="0" err="1"/>
+              <a:t>sobre</a:t>
+            </a:r>
+            <a:r>
+              <a:rPr lang="en-US" dirty="0"/>
+              <a:t> </a:t>
+            </a:r>
+            <a:r>
+              <a:rPr lang="en-US" dirty="0" err="1"/>
+              <a:t>os</a:t>
+            </a:r>
+            <a:r>
+              <a:rPr lang="en-US" dirty="0"/>
+              <a:t> </a:t>
+            </a:r>
+            <a:r>
+              <a:rPr lang="en-US" dirty="0" err="1"/>
+              <a:t>parâmetros</a:t>
+            </a:r>
+            <a:r>
+              <a:rPr lang="en-US" dirty="0"/>
+              <a:t> </a:t>
+            </a:r>
+            <a:r>
+              <a:rPr lang="en-US" dirty="0" err="1"/>
+              <a:t>utilizados</a:t>
+            </a:r>
+            <a:r>
+              <a:rPr lang="en-US" dirty="0"/>
+              <a:t> no </a:t>
+            </a:r>
+            <a:r>
+              <a:rPr lang="en-US" dirty="0" err="1"/>
+              <a:t>modelo</a:t>
+            </a:r>
+            <a:r>
+              <a:rPr lang="en-US" dirty="0"/>
+              <a:t> a </a:t>
+            </a:r>
+            <a:r>
+              <a:rPr lang="en-US" dirty="0" err="1"/>
+              <a:t>partir</a:t>
+            </a:r>
+            <a:r>
+              <a:rPr lang="en-US" dirty="0"/>
+              <a:t> de </a:t>
+            </a:r>
+            <a:r>
+              <a:rPr lang="en-US" dirty="0" err="1"/>
+              <a:t>experimentos</a:t>
+            </a:r>
+            <a:r>
+              <a:rPr lang="en-US" dirty="0"/>
+              <a:t> no dataset</a:t>
             </a:r>
           </a:p>
         </p:txBody>
@@ -6486,10 +6540,887 @@
         </p:nvSpPr>
         <p:spPr/>
         <p:txBody>
-          <a:bodyPr/>
+          <a:bodyPr>
+            <a:normAutofit fontScale="77500" lnSpcReduction="20000"/>
+          </a:bodyPr>
           <a:lstStyle/>
           <a:p>
-            <a:endParaRPr lang="en-US"/>
+            <a:r>
+              <a:rPr lang="en-US" b="1" dirty="0"/>
+              <a:t>Epochs</a:t>
+            </a:r>
+            <a:r>
+              <a:rPr lang="en-US" dirty="0"/>
+              <a:t>: o </a:t>
+            </a:r>
+            <a:r>
+              <a:rPr lang="en-US" dirty="0" err="1"/>
+              <a:t>número</a:t>
+            </a:r>
+            <a:r>
+              <a:rPr lang="en-US" dirty="0"/>
+              <a:t> de </a:t>
+            </a:r>
+            <a:r>
+              <a:rPr lang="en-US" dirty="0" err="1"/>
+              <a:t>épocas</a:t>
+            </a:r>
+            <a:r>
+              <a:rPr lang="en-US" dirty="0"/>
+              <a:t> de </a:t>
+            </a:r>
+            <a:r>
+              <a:rPr lang="en-US" dirty="0" err="1"/>
+              <a:t>treinamento</a:t>
+            </a:r>
+            <a:r>
+              <a:rPr lang="en-US" dirty="0"/>
+              <a:t> no </a:t>
+            </a:r>
+            <a:r>
+              <a:rPr lang="en-US" dirty="0" err="1"/>
+              <a:t>momento</a:t>
+            </a:r>
+            <a:r>
+              <a:rPr lang="en-US" dirty="0"/>
+              <a:t> </a:t>
+            </a:r>
+            <a:r>
+              <a:rPr lang="en-US" dirty="0" err="1"/>
+              <a:t>está</a:t>
+            </a:r>
+            <a:r>
+              <a:rPr lang="en-US" dirty="0"/>
+              <a:t> </a:t>
+            </a:r>
+            <a:r>
+              <a:rPr lang="en-US" dirty="0" err="1"/>
+              <a:t>pequeno</a:t>
+            </a:r>
+            <a:r>
+              <a:rPr lang="en-US" dirty="0"/>
+              <a:t>. O </a:t>
+            </a:r>
+            <a:r>
+              <a:rPr lang="en-US" dirty="0" err="1"/>
+              <a:t>intervalo</a:t>
+            </a:r>
+            <a:r>
+              <a:rPr lang="en-US" dirty="0"/>
+              <a:t> </a:t>
+            </a:r>
+            <a:r>
+              <a:rPr lang="en-US" dirty="0" err="1"/>
+              <a:t>utilizado</a:t>
+            </a:r>
+            <a:r>
+              <a:rPr lang="en-US" dirty="0"/>
+              <a:t> </a:t>
+            </a:r>
+            <a:r>
+              <a:rPr lang="en-US" dirty="0" err="1"/>
+              <a:t>por</a:t>
+            </a:r>
+            <a:r>
+              <a:rPr lang="en-US" dirty="0"/>
+              <a:t> </a:t>
+            </a:r>
+            <a:r>
+              <a:rPr lang="en-US" dirty="0" err="1"/>
+              <a:t>mim</a:t>
+            </a:r>
+            <a:r>
+              <a:rPr lang="en-US" dirty="0"/>
+              <a:t> </a:t>
+            </a:r>
+            <a:r>
+              <a:rPr lang="en-US" dirty="0" err="1"/>
+              <a:t>está</a:t>
+            </a:r>
+            <a:r>
+              <a:rPr lang="en-US" dirty="0"/>
+              <a:t> [1, 4]. </a:t>
+            </a:r>
+            <a:r>
+              <a:rPr lang="en-US" dirty="0" err="1"/>
+              <a:t>Quando</a:t>
+            </a:r>
+            <a:r>
+              <a:rPr lang="en-US" dirty="0"/>
+              <a:t> </a:t>
+            </a:r>
+            <a:r>
+              <a:rPr lang="en-US" dirty="0" err="1"/>
+              <a:t>eu</a:t>
+            </a:r>
+            <a:r>
+              <a:rPr lang="en-US" dirty="0"/>
+              <a:t> </a:t>
+            </a:r>
+            <a:r>
+              <a:rPr lang="en-US" dirty="0" err="1"/>
+              <a:t>coloco</a:t>
+            </a:r>
+            <a:r>
+              <a:rPr lang="en-US" dirty="0"/>
+              <a:t> 10 </a:t>
+            </a:r>
+            <a:r>
+              <a:rPr lang="en-US" dirty="0" err="1"/>
+              <a:t>ou</a:t>
+            </a:r>
+            <a:r>
+              <a:rPr lang="en-US" dirty="0"/>
+              <a:t> 100, </a:t>
+            </a:r>
+            <a:r>
+              <a:rPr lang="en-US" dirty="0" err="1"/>
+              <a:t>ocorre</a:t>
+            </a:r>
+            <a:r>
+              <a:rPr lang="en-US" dirty="0"/>
+              <a:t> overfitting.</a:t>
+            </a:r>
+          </a:p>
+          <a:p>
+            <a:r>
+              <a:rPr lang="en-US" b="1" dirty="0"/>
+              <a:t>Batch size</a:t>
+            </a:r>
+            <a:r>
+              <a:rPr lang="en-US" dirty="0"/>
+              <a:t>: </a:t>
+            </a:r>
+            <a:r>
+              <a:rPr lang="en-US" dirty="0" err="1"/>
+              <a:t>Inicialmente</a:t>
+            </a:r>
+            <a:r>
+              <a:rPr lang="en-US" dirty="0"/>
+              <a:t> </a:t>
+            </a:r>
+            <a:r>
+              <a:rPr lang="en-US" dirty="0" err="1"/>
+              <a:t>eu</a:t>
+            </a:r>
+            <a:r>
+              <a:rPr lang="en-US" dirty="0"/>
+              <a:t> </a:t>
+            </a:r>
+            <a:r>
+              <a:rPr lang="en-US" dirty="0" err="1"/>
+              <a:t>tentei</a:t>
+            </a:r>
+            <a:r>
+              <a:rPr lang="en-US" dirty="0"/>
+              <a:t> 32, 64. </a:t>
+            </a:r>
+            <a:r>
+              <a:rPr lang="en-US" dirty="0" err="1"/>
+              <a:t>Porém</a:t>
+            </a:r>
+            <a:r>
+              <a:rPr lang="en-US" dirty="0"/>
+              <a:t>, o </a:t>
+            </a:r>
+            <a:r>
+              <a:rPr lang="en-US" dirty="0" err="1"/>
+              <a:t>modelo</a:t>
+            </a:r>
+            <a:r>
+              <a:rPr lang="en-US" dirty="0"/>
+              <a:t> </a:t>
+            </a:r>
+            <a:r>
+              <a:rPr lang="en-US" dirty="0" err="1"/>
+              <a:t>obteve</a:t>
+            </a:r>
+            <a:r>
+              <a:rPr lang="en-US" dirty="0"/>
+              <a:t> </a:t>
+            </a:r>
+            <a:r>
+              <a:rPr lang="en-US" dirty="0" err="1"/>
+              <a:t>melhoras</a:t>
+            </a:r>
+            <a:r>
+              <a:rPr lang="en-US" dirty="0"/>
+              <a:t> a </a:t>
+            </a:r>
+            <a:r>
+              <a:rPr lang="en-US" dirty="0" err="1"/>
+              <a:t>partir</a:t>
+            </a:r>
+            <a:r>
+              <a:rPr lang="en-US" dirty="0"/>
+              <a:t> de 128 e 256. </a:t>
+            </a:r>
+            <a:r>
+              <a:rPr lang="en-US" dirty="0" err="1"/>
+              <a:t>Chegando</a:t>
+            </a:r>
+            <a:r>
+              <a:rPr lang="en-US" dirty="0"/>
+              <a:t> a </a:t>
+            </a:r>
+            <a:r>
+              <a:rPr lang="en-US" dirty="0" err="1"/>
+              <a:t>ter</a:t>
+            </a:r>
+            <a:r>
+              <a:rPr lang="en-US" dirty="0"/>
+              <a:t> </a:t>
+            </a:r>
+            <a:r>
+              <a:rPr lang="en-US" dirty="0" err="1"/>
+              <a:t>precisão</a:t>
+            </a:r>
+            <a:r>
+              <a:rPr lang="en-US" dirty="0"/>
+              <a:t> final de 100% de </a:t>
+            </a:r>
+            <a:r>
+              <a:rPr lang="en-US" dirty="0" err="1"/>
+              <a:t>acerto</a:t>
+            </a:r>
+            <a:r>
+              <a:rPr lang="en-US" dirty="0"/>
+              <a:t>. </a:t>
+            </a:r>
+          </a:p>
+          <a:p>
+            <a:r>
+              <a:rPr lang="en-US" b="1" dirty="0"/>
+              <a:t>Hidden dims LSTM</a:t>
+            </a:r>
+            <a:r>
+              <a:rPr lang="en-US" dirty="0"/>
+              <a:t>: </a:t>
+            </a:r>
+            <a:r>
+              <a:rPr lang="en-US" dirty="0" err="1"/>
+              <a:t>Atualmente</a:t>
+            </a:r>
+            <a:r>
+              <a:rPr lang="en-US" dirty="0"/>
+              <a:t> </a:t>
+            </a:r>
+            <a:r>
+              <a:rPr lang="en-US" dirty="0" err="1"/>
+              <a:t>estou</a:t>
+            </a:r>
+            <a:r>
+              <a:rPr lang="en-US" dirty="0"/>
+              <a:t> </a:t>
+            </a:r>
+            <a:r>
+              <a:rPr lang="en-US" dirty="0" err="1"/>
+              <a:t>usando</a:t>
+            </a:r>
+            <a:r>
+              <a:rPr lang="en-US" dirty="0"/>
+              <a:t> 50 e 500. </a:t>
+            </a:r>
+            <a:r>
+              <a:rPr lang="en-US" dirty="0" err="1"/>
+              <a:t>Não</a:t>
+            </a:r>
+            <a:r>
+              <a:rPr lang="en-US" dirty="0"/>
+              <a:t> </a:t>
+            </a:r>
+            <a:r>
+              <a:rPr lang="en-US" dirty="0" err="1"/>
+              <a:t>notei</a:t>
+            </a:r>
+            <a:r>
+              <a:rPr lang="en-US" dirty="0"/>
+              <a:t> </a:t>
+            </a:r>
+            <a:r>
+              <a:rPr lang="en-US" dirty="0" err="1"/>
+              <a:t>diferença</a:t>
+            </a:r>
+            <a:r>
+              <a:rPr lang="en-US" dirty="0"/>
+              <a:t> </a:t>
+            </a:r>
+            <a:r>
+              <a:rPr lang="en-US" dirty="0" err="1"/>
+              <a:t>ainda</a:t>
+            </a:r>
+            <a:r>
+              <a:rPr lang="en-US" dirty="0"/>
+              <a:t>. </a:t>
+            </a:r>
+            <a:r>
+              <a:rPr lang="en-US" dirty="0" err="1"/>
+              <a:t>Preciso</a:t>
+            </a:r>
+            <a:r>
+              <a:rPr lang="en-US" dirty="0"/>
+              <a:t> </a:t>
+            </a:r>
+            <a:r>
+              <a:rPr lang="en-US" dirty="0" err="1"/>
+              <a:t>verificar</a:t>
+            </a:r>
+            <a:r>
+              <a:rPr lang="en-US" dirty="0"/>
+              <a:t> se </a:t>
+            </a:r>
+            <a:r>
+              <a:rPr lang="en-US" dirty="0" err="1"/>
+              <a:t>há</a:t>
+            </a:r>
+            <a:r>
+              <a:rPr lang="en-US" dirty="0"/>
+              <a:t> outros </a:t>
+            </a:r>
+            <a:r>
+              <a:rPr lang="en-US" dirty="0" err="1"/>
+              <a:t>fatores</a:t>
+            </a:r>
+            <a:r>
+              <a:rPr lang="en-US" dirty="0"/>
+              <a:t> que </a:t>
+            </a:r>
+            <a:r>
+              <a:rPr lang="en-US" dirty="0" err="1"/>
+              <a:t>estejam</a:t>
+            </a:r>
+            <a:r>
+              <a:rPr lang="en-US" dirty="0"/>
+              <a:t> </a:t>
+            </a:r>
+            <a:r>
+              <a:rPr lang="en-US" dirty="0" err="1"/>
+              <a:t>influenciando</a:t>
+            </a:r>
+            <a:r>
+              <a:rPr lang="en-US" dirty="0"/>
+              <a:t> o </a:t>
+            </a:r>
+            <a:r>
+              <a:rPr lang="en-US" dirty="0" err="1"/>
+              <a:t>aprendizado</a:t>
+            </a:r>
+            <a:r>
+              <a:rPr lang="en-US" dirty="0"/>
+              <a:t>. E </a:t>
+            </a:r>
+            <a:r>
+              <a:rPr lang="en-US" dirty="0" err="1"/>
+              <a:t>depois</a:t>
+            </a:r>
+            <a:r>
+              <a:rPr lang="en-US" dirty="0"/>
+              <a:t> </a:t>
+            </a:r>
+            <a:r>
+              <a:rPr lang="en-US" dirty="0" err="1"/>
+              <a:t>olhar</a:t>
+            </a:r>
+            <a:r>
+              <a:rPr lang="en-US" dirty="0"/>
+              <a:t> </a:t>
+            </a:r>
+            <a:r>
+              <a:rPr lang="en-US" dirty="0" err="1"/>
+              <a:t>este</a:t>
+            </a:r>
+            <a:r>
+              <a:rPr lang="en-US" dirty="0"/>
+              <a:t> </a:t>
+            </a:r>
+            <a:r>
+              <a:rPr lang="en-US" dirty="0" err="1"/>
+              <a:t>parâmetro</a:t>
+            </a:r>
+            <a:r>
+              <a:rPr lang="en-US" dirty="0"/>
+              <a:t>.</a:t>
+            </a:r>
+          </a:p>
+          <a:p>
+            <a:r>
+              <a:rPr lang="en-US" b="1" dirty="0" err="1"/>
+              <a:t>Tamanho</a:t>
+            </a:r>
+            <a:r>
+              <a:rPr lang="en-US" b="1" dirty="0"/>
+              <a:t> do </a:t>
+            </a:r>
+            <a:r>
+              <a:rPr lang="en-US" b="1" dirty="0" err="1"/>
+              <a:t>vocabulário</a:t>
+            </a:r>
+            <a:r>
+              <a:rPr lang="en-US" dirty="0"/>
+              <a:t>: Para </a:t>
+            </a:r>
+            <a:r>
+              <a:rPr lang="en-US" dirty="0" err="1"/>
+              <a:t>transformar</a:t>
+            </a:r>
+            <a:r>
+              <a:rPr lang="en-US" dirty="0"/>
+              <a:t> o </a:t>
+            </a:r>
+            <a:r>
+              <a:rPr lang="en-US" dirty="0" err="1"/>
+              <a:t>texto</a:t>
+            </a:r>
+            <a:r>
+              <a:rPr lang="en-US" dirty="0"/>
+              <a:t> </a:t>
+            </a:r>
+            <a:r>
+              <a:rPr lang="en-US" dirty="0" err="1"/>
+              <a:t>em</a:t>
+            </a:r>
+            <a:r>
+              <a:rPr lang="en-US" dirty="0"/>
+              <a:t> </a:t>
+            </a:r>
+            <a:r>
+              <a:rPr lang="en-US" dirty="0" err="1"/>
+              <a:t>vetor</a:t>
+            </a:r>
+            <a:r>
+              <a:rPr lang="en-US" dirty="0"/>
+              <a:t> de </a:t>
+            </a:r>
+            <a:r>
+              <a:rPr lang="en-US" dirty="0" err="1"/>
+              <a:t>números</a:t>
+            </a:r>
+            <a:r>
+              <a:rPr lang="en-US" dirty="0"/>
+              <a:t>, </a:t>
+            </a:r>
+            <a:r>
+              <a:rPr lang="en-US" dirty="0" err="1"/>
+              <a:t>foi</a:t>
+            </a:r>
+            <a:r>
+              <a:rPr lang="en-US" dirty="0"/>
+              <a:t> </a:t>
+            </a:r>
+            <a:r>
+              <a:rPr lang="en-US" dirty="0" err="1"/>
+              <a:t>utilizado</a:t>
+            </a:r>
+            <a:r>
+              <a:rPr lang="en-US" dirty="0"/>
+              <a:t> a </a:t>
+            </a:r>
+            <a:r>
+              <a:rPr lang="en-US" dirty="0" err="1"/>
+              <a:t>função</a:t>
+            </a:r>
+            <a:r>
+              <a:rPr lang="en-US" dirty="0"/>
+              <a:t> Tokenizer do </a:t>
+            </a:r>
+            <a:r>
+              <a:rPr lang="en-US" dirty="0" err="1"/>
+              <a:t>Keras</a:t>
+            </a:r>
+            <a:r>
+              <a:rPr lang="en-US" dirty="0"/>
+              <a:t>. Ela remove </a:t>
+            </a:r>
+            <a:r>
+              <a:rPr lang="en-US" dirty="0" err="1"/>
+              <a:t>pontuação</a:t>
+            </a:r>
+            <a:r>
+              <a:rPr lang="en-US" dirty="0"/>
+              <a:t>, </a:t>
+            </a:r>
+            <a:r>
+              <a:rPr lang="en-US" dirty="0" err="1"/>
+              <a:t>acentuação</a:t>
+            </a:r>
+            <a:r>
+              <a:rPr lang="en-US" dirty="0"/>
+              <a:t> e </a:t>
+            </a:r>
+            <a:r>
+              <a:rPr lang="en-US" dirty="0" err="1"/>
+              <a:t>caracteres</a:t>
+            </a:r>
+            <a:r>
+              <a:rPr lang="en-US" dirty="0"/>
+              <a:t> </a:t>
+            </a:r>
+            <a:r>
+              <a:rPr lang="en-US" dirty="0" err="1"/>
+              <a:t>especiais</a:t>
+            </a:r>
+            <a:r>
+              <a:rPr lang="en-US" dirty="0"/>
+              <a:t>. Mas </a:t>
+            </a:r>
+            <a:r>
+              <a:rPr lang="en-US" dirty="0" err="1"/>
+              <a:t>não</a:t>
+            </a:r>
+            <a:r>
+              <a:rPr lang="en-US" dirty="0"/>
+              <a:t> </a:t>
+            </a:r>
+            <a:r>
+              <a:rPr lang="en-US" dirty="0" err="1"/>
+              <a:t>foi</a:t>
+            </a:r>
+            <a:r>
+              <a:rPr lang="en-US" dirty="0"/>
+              <a:t> </a:t>
+            </a:r>
+            <a:r>
+              <a:rPr lang="en-US" dirty="0" err="1"/>
+              <a:t>feito</a:t>
+            </a:r>
+            <a:r>
+              <a:rPr lang="en-US" dirty="0"/>
+              <a:t> </a:t>
+            </a:r>
+            <a:r>
+              <a:rPr lang="en-US" dirty="0" err="1"/>
+              <a:t>tratamento</a:t>
+            </a:r>
+            <a:r>
+              <a:rPr lang="en-US" dirty="0"/>
+              <a:t> </a:t>
+            </a:r>
+            <a:r>
+              <a:rPr lang="en-US" dirty="0" err="1"/>
+              <a:t>como</a:t>
+            </a:r>
+            <a:r>
+              <a:rPr lang="en-US" dirty="0"/>
+              <a:t> Stemming e lemmatization das </a:t>
+            </a:r>
+            <a:r>
+              <a:rPr lang="en-US" dirty="0" err="1"/>
+              <a:t>questões</a:t>
+            </a:r>
+            <a:r>
+              <a:rPr lang="en-US" dirty="0"/>
+              <a:t>. </a:t>
+            </a:r>
+            <a:r>
+              <a:rPr lang="en-US" dirty="0" err="1"/>
+              <a:t>É</a:t>
+            </a:r>
+            <a:r>
+              <a:rPr lang="en-US" dirty="0"/>
+              <a:t> </a:t>
+            </a:r>
+            <a:r>
+              <a:rPr lang="en-US" dirty="0" err="1"/>
+              <a:t>algo</a:t>
+            </a:r>
+            <a:r>
+              <a:rPr lang="en-US" dirty="0"/>
+              <a:t> a </a:t>
+            </a:r>
+            <a:r>
+              <a:rPr lang="en-US" dirty="0" err="1"/>
+              <a:t>ser</a:t>
+            </a:r>
+            <a:r>
+              <a:rPr lang="en-US" dirty="0"/>
+              <a:t> </a:t>
+            </a:r>
+            <a:r>
+              <a:rPr lang="en-US" dirty="0" err="1"/>
+              <a:t>pensado</a:t>
+            </a:r>
+            <a:r>
+              <a:rPr lang="en-US" dirty="0"/>
+              <a:t>. </a:t>
+            </a:r>
+            <a:r>
+              <a:rPr lang="en-US" dirty="0" err="1"/>
+              <a:t>Além</a:t>
+            </a:r>
+            <a:r>
+              <a:rPr lang="en-US" dirty="0"/>
+              <a:t> </a:t>
+            </a:r>
+            <a:r>
+              <a:rPr lang="en-US" dirty="0" err="1"/>
+              <a:t>disso</a:t>
+            </a:r>
+            <a:r>
+              <a:rPr lang="en-US" dirty="0"/>
+              <a:t>, </a:t>
+            </a:r>
+            <a:r>
+              <a:rPr lang="en-US" dirty="0" err="1"/>
+              <a:t>foi</a:t>
+            </a:r>
+            <a:r>
+              <a:rPr lang="en-US" dirty="0"/>
+              <a:t> </a:t>
+            </a:r>
+            <a:r>
+              <a:rPr lang="en-US" dirty="0" err="1"/>
+              <a:t>mantido</a:t>
+            </a:r>
+            <a:r>
+              <a:rPr lang="en-US" dirty="0"/>
+              <a:t> o </a:t>
+            </a:r>
+            <a:r>
+              <a:rPr lang="en-US" dirty="0" err="1"/>
+              <a:t>vocabulário</a:t>
+            </a:r>
+            <a:r>
+              <a:rPr lang="en-US" dirty="0"/>
+              <a:t> </a:t>
+            </a:r>
+            <a:r>
+              <a:rPr lang="en-US" dirty="0" err="1"/>
+              <a:t>inteiro</a:t>
+            </a:r>
+            <a:r>
+              <a:rPr lang="en-US" dirty="0"/>
+              <a:t>, </a:t>
+            </a:r>
+            <a:r>
+              <a:rPr lang="en-US" dirty="0" err="1"/>
+              <a:t>não</a:t>
+            </a:r>
+            <a:r>
+              <a:rPr lang="en-US" dirty="0"/>
+              <a:t> </a:t>
+            </a:r>
+            <a:r>
+              <a:rPr lang="en-US" dirty="0" err="1"/>
+              <a:t>limitou</a:t>
+            </a:r>
+            <a:r>
+              <a:rPr lang="en-US" dirty="0"/>
+              <a:t> a </a:t>
+            </a:r>
+            <a:r>
+              <a:rPr lang="en-US" dirty="0" err="1"/>
+              <a:t>incluir</a:t>
+            </a:r>
+            <a:r>
+              <a:rPr lang="en-US" dirty="0"/>
+              <a:t> </a:t>
+            </a:r>
+            <a:r>
+              <a:rPr lang="en-US" dirty="0" err="1"/>
+              <a:t>somente</a:t>
+            </a:r>
+            <a:r>
+              <a:rPr lang="en-US" dirty="0"/>
+              <a:t> </a:t>
+            </a:r>
+            <a:r>
+              <a:rPr lang="en-US" dirty="0" err="1"/>
+              <a:t>palavras</a:t>
+            </a:r>
+            <a:r>
+              <a:rPr lang="en-US" dirty="0"/>
+              <a:t> que </a:t>
+            </a:r>
+            <a:r>
+              <a:rPr lang="en-US" dirty="0" err="1"/>
+              <a:t>aparecem</a:t>
+            </a:r>
+            <a:r>
+              <a:rPr lang="en-US" dirty="0"/>
+              <a:t> 5 </a:t>
+            </a:r>
+            <a:r>
+              <a:rPr lang="en-US" dirty="0" err="1"/>
+              <a:t>vezes</a:t>
+            </a:r>
+            <a:r>
+              <a:rPr lang="en-US" dirty="0"/>
+              <a:t> </a:t>
+            </a:r>
+            <a:r>
+              <a:rPr lang="en-US" dirty="0" err="1"/>
+              <a:t>ou</a:t>
+            </a:r>
+            <a:r>
+              <a:rPr lang="en-US" dirty="0"/>
+              <a:t> </a:t>
+            </a:r>
+            <a:r>
+              <a:rPr lang="en-US" dirty="0" err="1"/>
+              <a:t>mais</a:t>
+            </a:r>
+            <a:r>
+              <a:rPr lang="en-US" dirty="0"/>
+              <a:t>, </a:t>
+            </a:r>
+            <a:r>
+              <a:rPr lang="en-US" dirty="0" err="1"/>
+              <a:t>por</a:t>
+            </a:r>
+            <a:r>
+              <a:rPr lang="en-US" dirty="0"/>
+              <a:t> </a:t>
+            </a:r>
+            <a:r>
+              <a:rPr lang="en-US" dirty="0" err="1"/>
+              <a:t>exemplo</a:t>
+            </a:r>
+            <a:r>
+              <a:rPr lang="en-US" dirty="0"/>
+              <a:t>. </a:t>
+            </a:r>
+            <a:r>
+              <a:rPr lang="en-US" dirty="0" err="1"/>
+              <a:t>Foi</a:t>
+            </a:r>
+            <a:r>
+              <a:rPr lang="en-US" dirty="0"/>
+              <a:t> </a:t>
+            </a:r>
+            <a:r>
+              <a:rPr lang="en-US" dirty="0" err="1"/>
+              <a:t>feito</a:t>
+            </a:r>
+            <a:r>
+              <a:rPr lang="en-US" dirty="0"/>
+              <a:t> um </a:t>
+            </a:r>
+            <a:r>
+              <a:rPr lang="en-US" dirty="0" err="1"/>
+              <a:t>tratamento</a:t>
+            </a:r>
+            <a:r>
+              <a:rPr lang="en-US" dirty="0"/>
+              <a:t> no </a:t>
+            </a:r>
+            <a:r>
+              <a:rPr lang="en-US" dirty="0" err="1"/>
+              <a:t>código</a:t>
+            </a:r>
+            <a:r>
+              <a:rPr lang="en-US" dirty="0"/>
+              <a:t> </a:t>
+            </a:r>
+            <a:r>
+              <a:rPr lang="en-US" dirty="0" err="1"/>
+              <a:t>fonte</a:t>
+            </a:r>
+            <a:r>
+              <a:rPr lang="en-US" dirty="0"/>
+              <a:t>, </a:t>
+            </a:r>
+            <a:r>
+              <a:rPr lang="en-US" dirty="0" err="1"/>
+              <a:t>através</a:t>
+            </a:r>
+            <a:r>
+              <a:rPr lang="en-US" dirty="0"/>
+              <a:t> do </a:t>
+            </a:r>
+            <a:r>
+              <a:rPr lang="en-US" dirty="0" err="1"/>
+              <a:t>algoritmo</a:t>
+            </a:r>
+            <a:r>
+              <a:rPr lang="en-US" dirty="0"/>
+              <a:t> </a:t>
+            </a:r>
+            <a:r>
+              <a:rPr lang="en-US" dirty="0" err="1"/>
+              <a:t>disponibilizado</a:t>
+            </a:r>
+            <a:r>
+              <a:rPr lang="en-US" dirty="0"/>
+              <a:t> </a:t>
+            </a:r>
+            <a:r>
+              <a:rPr lang="en-US" dirty="0" err="1"/>
+              <a:t>por</a:t>
+            </a:r>
+            <a:r>
+              <a:rPr lang="en-US" dirty="0"/>
+              <a:t> Yao et al (2018) que </a:t>
+            </a:r>
+            <a:r>
+              <a:rPr lang="en-US" dirty="0" err="1"/>
+              <a:t>substitui</a:t>
+            </a:r>
+            <a:r>
+              <a:rPr lang="en-US" dirty="0"/>
+              <a:t> </a:t>
+            </a:r>
+            <a:r>
+              <a:rPr lang="en-US" dirty="0" err="1"/>
+              <a:t>número</a:t>
+            </a:r>
+            <a:r>
+              <a:rPr lang="en-US" dirty="0"/>
+              <a:t> e strings </a:t>
+            </a:r>
+            <a:r>
+              <a:rPr lang="en-US" dirty="0" err="1"/>
+              <a:t>pelas</a:t>
+            </a:r>
+            <a:r>
+              <a:rPr lang="en-US" dirty="0"/>
+              <a:t> </a:t>
+            </a:r>
+            <a:r>
+              <a:rPr lang="en-US" dirty="0" err="1"/>
+              <a:t>palavras</a:t>
+            </a:r>
+            <a:r>
+              <a:rPr lang="en-US" dirty="0"/>
+              <a:t> NUMBER e STRING </a:t>
+            </a:r>
+            <a:r>
+              <a:rPr lang="en-US" dirty="0" err="1"/>
+              <a:t>respectivamente</a:t>
+            </a:r>
+            <a:r>
+              <a:rPr lang="en-US" dirty="0"/>
+              <a:t>. E o </a:t>
+            </a:r>
+            <a:r>
+              <a:rPr lang="en-US" dirty="0" err="1"/>
+              <a:t>nome</a:t>
+            </a:r>
+            <a:r>
+              <a:rPr lang="en-US" dirty="0"/>
+              <a:t> das </a:t>
+            </a:r>
+            <a:r>
+              <a:rPr lang="en-US" dirty="0" err="1"/>
+              <a:t>variáveis</a:t>
+            </a:r>
+            <a:r>
+              <a:rPr lang="en-US" dirty="0"/>
+              <a:t> pela </a:t>
+            </a:r>
+            <a:r>
+              <a:rPr lang="en-US" dirty="0" err="1"/>
+              <a:t>palavra</a:t>
+            </a:r>
+            <a:r>
+              <a:rPr lang="en-US" dirty="0"/>
+              <a:t> VAR.</a:t>
+            </a:r>
+          </a:p>
+          <a:p>
+            <a:endParaRPr lang="en-US" dirty="0"/>
+          </a:p>
+          <a:p>
+            <a:endParaRPr lang="en-US" dirty="0"/>
           </a:p>
         </p:txBody>
       </p:sp>
@@ -6528,6 +7459,349 @@
           <p:cNvPr id="2" name="Title 1">
             <a:extLst>
               <a:ext uri="{FF2B5EF4-FFF2-40B4-BE49-F238E27FC236}">
+                <a16:creationId xmlns:a16="http://schemas.microsoft.com/office/drawing/2014/main" id="{DCE7FE42-E089-E847-AD82-762E82E95B1E}"/>
+              </a:ext>
+            </a:extLst>
+          </p:cNvPr>
+          <p:cNvSpPr>
+            <a:spLocks noGrp="1"/>
+          </p:cNvSpPr>
+          <p:nvPr>
+            <p:ph type="title"/>
+          </p:nvPr>
+        </p:nvSpPr>
+        <p:spPr/>
+        <p:txBody>
+          <a:bodyPr>
+            <a:normAutofit/>
+          </a:bodyPr>
+          <a:lstStyle/>
+          <a:p>
+            <a:r>
+              <a:rPr lang="en-US" dirty="0"/>
+              <a:t>Outros </a:t>
+            </a:r>
+            <a:r>
+              <a:rPr lang="en-US" dirty="0" err="1"/>
+              <a:t>parâmetros</a:t>
+            </a:r>
+            <a:endParaRPr lang="en-US" dirty="0"/>
+          </a:p>
+        </p:txBody>
+      </p:sp>
+      <p:sp>
+        <p:nvSpPr>
+          <p:cNvPr id="18" name="Content Placeholder 17">
+            <a:extLst>
+              <a:ext uri="{FF2B5EF4-FFF2-40B4-BE49-F238E27FC236}">
+                <a16:creationId xmlns:a16="http://schemas.microsoft.com/office/drawing/2014/main" id="{5F60F2B3-A87A-494C-8C0A-867181A532E7}"/>
+              </a:ext>
+            </a:extLst>
+          </p:cNvPr>
+          <p:cNvSpPr>
+            <a:spLocks noGrp="1"/>
+          </p:cNvSpPr>
+          <p:nvPr>
+            <p:ph idx="1"/>
+          </p:nvPr>
+        </p:nvSpPr>
+        <p:spPr/>
+        <p:txBody>
+          <a:bodyPr>
+            <a:normAutofit/>
+          </a:bodyPr>
+          <a:lstStyle/>
+          <a:p>
+            <a:r>
+              <a:rPr lang="en-US" b="1" dirty="0" err="1"/>
+              <a:t>Tamanho</a:t>
+            </a:r>
+            <a:r>
+              <a:rPr lang="en-US" b="1" dirty="0"/>
+              <a:t> do input</a:t>
+            </a:r>
+            <a:r>
+              <a:rPr lang="en-US" dirty="0"/>
+              <a:t>: </a:t>
+            </a:r>
+            <a:r>
+              <a:rPr lang="en-US" dirty="0" err="1"/>
+              <a:t>Tamanho</a:t>
+            </a:r>
+            <a:r>
+              <a:rPr lang="en-US" dirty="0"/>
+              <a:t> do </a:t>
+            </a:r>
+            <a:r>
+              <a:rPr lang="en-US" dirty="0" err="1"/>
+              <a:t>vetor</a:t>
+            </a:r>
+            <a:r>
+              <a:rPr lang="en-US" dirty="0"/>
+              <a:t> de entrada. </a:t>
+            </a:r>
+            <a:r>
+              <a:rPr lang="en-US" dirty="0" err="1"/>
+              <a:t>Estou</a:t>
+            </a:r>
+            <a:r>
+              <a:rPr lang="en-US" dirty="0"/>
+              <a:t> </a:t>
+            </a:r>
+            <a:r>
+              <a:rPr lang="en-US" dirty="0" err="1"/>
+              <a:t>usando</a:t>
+            </a:r>
+            <a:r>
+              <a:rPr lang="en-US" dirty="0"/>
+              <a:t> o </a:t>
+            </a:r>
+            <a:r>
+              <a:rPr lang="en-US" dirty="0" err="1"/>
+              <a:t>tamanho</a:t>
+            </a:r>
+            <a:r>
+              <a:rPr lang="en-US" dirty="0"/>
+              <a:t> 30. As </a:t>
+            </a:r>
+            <a:r>
+              <a:rPr lang="en-US" dirty="0" err="1"/>
+              <a:t>questões</a:t>
+            </a:r>
+            <a:r>
+              <a:rPr lang="en-US" dirty="0"/>
+              <a:t> de </a:t>
+            </a:r>
+            <a:r>
+              <a:rPr lang="en-US" dirty="0" err="1"/>
+              <a:t>acordo</a:t>
+            </a:r>
+            <a:r>
+              <a:rPr lang="en-US" dirty="0"/>
+              <a:t> com o </a:t>
+            </a:r>
+            <a:r>
+              <a:rPr lang="en-US" dirty="0" err="1"/>
+              <a:t>histograma</a:t>
+            </a:r>
+            <a:r>
+              <a:rPr lang="en-US" dirty="0"/>
+              <a:t>, </a:t>
+            </a:r>
+            <a:r>
+              <a:rPr lang="en-US" dirty="0" err="1"/>
+              <a:t>nao</a:t>
+            </a:r>
+            <a:r>
+              <a:rPr lang="en-US" dirty="0"/>
+              <a:t> </a:t>
+            </a:r>
+            <a:r>
+              <a:rPr lang="en-US" dirty="0" err="1"/>
+              <a:t>passam</a:t>
+            </a:r>
+            <a:r>
+              <a:rPr lang="en-US" dirty="0"/>
+              <a:t> de 30 </a:t>
+            </a:r>
+            <a:r>
+              <a:rPr lang="en-US" dirty="0" err="1"/>
+              <a:t>palavras</a:t>
+            </a:r>
+            <a:r>
+              <a:rPr lang="en-US" dirty="0"/>
+              <a:t>. </a:t>
+            </a:r>
+            <a:r>
+              <a:rPr lang="en-US" dirty="0" err="1"/>
+              <a:t>Talvez</a:t>
+            </a:r>
+            <a:r>
+              <a:rPr lang="en-US" dirty="0"/>
+              <a:t> o </a:t>
+            </a:r>
+            <a:r>
+              <a:rPr lang="en-US" dirty="0" err="1"/>
+              <a:t>tamanho</a:t>
+            </a:r>
+            <a:r>
+              <a:rPr lang="en-US" dirty="0"/>
+              <a:t> do </a:t>
+            </a:r>
+            <a:r>
+              <a:rPr lang="en-US" dirty="0" err="1"/>
+              <a:t>vetor</a:t>
+            </a:r>
+            <a:r>
+              <a:rPr lang="en-US" dirty="0"/>
+              <a:t> de </a:t>
+            </a:r>
+            <a:r>
+              <a:rPr lang="en-US" dirty="0" err="1"/>
+              <a:t>respostas</a:t>
+            </a:r>
+            <a:r>
+              <a:rPr lang="en-US" dirty="0"/>
+              <a:t> </a:t>
+            </a:r>
+            <a:r>
+              <a:rPr lang="en-US" dirty="0" err="1"/>
+              <a:t>poderia</a:t>
+            </a:r>
+            <a:r>
+              <a:rPr lang="en-US" dirty="0"/>
+              <a:t> </a:t>
+            </a:r>
+            <a:r>
+              <a:rPr lang="en-US" dirty="0" err="1"/>
+              <a:t>ser</a:t>
+            </a:r>
+            <a:r>
+              <a:rPr lang="en-US" dirty="0"/>
+              <a:t> </a:t>
+            </a:r>
+            <a:r>
+              <a:rPr lang="en-US" dirty="0" err="1"/>
+              <a:t>alterado</a:t>
+            </a:r>
+            <a:r>
+              <a:rPr lang="en-US" dirty="0"/>
+              <a:t>.</a:t>
+            </a:r>
+          </a:p>
+          <a:p>
+            <a:r>
+              <a:rPr lang="en-US" b="1" dirty="0"/>
+              <a:t>Filters CNN</a:t>
+            </a:r>
+            <a:r>
+              <a:rPr lang="en-US" dirty="0"/>
+              <a:t>: Dimensionality of output space. </a:t>
+            </a:r>
+            <a:r>
+              <a:rPr lang="en-US" dirty="0" err="1"/>
+              <a:t>Não</a:t>
+            </a:r>
+            <a:r>
+              <a:rPr lang="en-US" dirty="0"/>
+              <a:t> </a:t>
+            </a:r>
+            <a:r>
+              <a:rPr lang="en-US" dirty="0" err="1"/>
+              <a:t>entendi</a:t>
+            </a:r>
+            <a:r>
+              <a:rPr lang="en-US" dirty="0"/>
+              <a:t> </a:t>
+            </a:r>
+            <a:r>
+              <a:rPr lang="en-US" dirty="0" err="1"/>
+              <a:t>este</a:t>
+            </a:r>
+            <a:r>
+              <a:rPr lang="en-US" dirty="0"/>
+              <a:t> </a:t>
+            </a:r>
+            <a:r>
+              <a:rPr lang="en-US" dirty="0" err="1"/>
+              <a:t>parâmetro</a:t>
+            </a:r>
+            <a:r>
+              <a:rPr lang="en-US" dirty="0"/>
+              <a:t> </a:t>
+            </a:r>
+            <a:r>
+              <a:rPr lang="en-US" dirty="0" err="1"/>
+              <a:t>ainda</a:t>
+            </a:r>
+            <a:r>
+              <a:rPr lang="en-US" dirty="0"/>
+              <a:t>. </a:t>
+            </a:r>
+            <a:r>
+              <a:rPr lang="en-US" dirty="0" err="1"/>
+              <a:t>Estou</a:t>
+            </a:r>
+            <a:r>
+              <a:rPr lang="en-US" dirty="0"/>
+              <a:t> </a:t>
+            </a:r>
+            <a:r>
+              <a:rPr lang="en-US" dirty="0" err="1"/>
+              <a:t>usando</a:t>
+            </a:r>
+            <a:r>
+              <a:rPr lang="en-US" dirty="0"/>
+              <a:t> o valor 500, </a:t>
+            </a:r>
+            <a:r>
+              <a:rPr lang="en-US" dirty="0" err="1"/>
+              <a:t>padrão</a:t>
+            </a:r>
+            <a:r>
+              <a:rPr lang="en-US" dirty="0"/>
+              <a:t> </a:t>
+            </a:r>
+            <a:r>
+              <a:rPr lang="en-US" dirty="0" err="1"/>
+              <a:t>utilizado</a:t>
+            </a:r>
+            <a:r>
+              <a:rPr lang="en-US" dirty="0"/>
+              <a:t> </a:t>
+            </a:r>
+            <a:r>
+              <a:rPr lang="en-US" dirty="0" err="1"/>
+              <a:t>pelo</a:t>
+            </a:r>
+            <a:r>
+              <a:rPr lang="en-US" dirty="0"/>
+              <a:t> Feng et al. (2015)</a:t>
+            </a:r>
+          </a:p>
+          <a:p>
+            <a:endParaRPr lang="en-US" dirty="0"/>
+          </a:p>
+          <a:p>
+            <a:endParaRPr lang="en-US" dirty="0"/>
+          </a:p>
+        </p:txBody>
+      </p:sp>
+    </p:spTree>
+    <p:extLst>
+      <p:ext uri="{BB962C8B-B14F-4D97-AF65-F5344CB8AC3E}">
+        <p14:creationId xmlns:p14="http://schemas.microsoft.com/office/powerpoint/2010/main" val="2927147688"/>
+      </p:ext>
+    </p:extLst>
+  </p:cSld>
+  <p:clrMapOvr>
+    <a:masterClrMapping/>
+  </p:clrMapOvr>
+</p:sld>
+</file>
+
+<file path=ppt/slides/slide19.xml><?xml version="1.0" encoding="utf-8"?>
+<p:sld xmlns:a="http://schemas.openxmlformats.org/drawingml/2006/main" xmlns:r="http://schemas.openxmlformats.org/officeDocument/2006/relationships" xmlns:p="http://schemas.openxmlformats.org/presentationml/2006/main">
+  <p:cSld>
+    <p:spTree>
+      <p:nvGrpSpPr>
+        <p:cNvPr id="1" name=""/>
+        <p:cNvGrpSpPr/>
+        <p:nvPr/>
+      </p:nvGrpSpPr>
+      <p:grpSpPr>
+        <a:xfrm>
+          <a:off x="0" y="0"/>
+          <a:ext cx="0" cy="0"/>
+          <a:chOff x="0" y="0"/>
+          <a:chExt cx="0" cy="0"/>
+        </a:xfrm>
+      </p:grpSpPr>
+      <p:sp>
+        <p:nvSpPr>
+          <p:cNvPr id="2" name="Title 1">
+            <a:extLst>
+              <a:ext uri="{FF2B5EF4-FFF2-40B4-BE49-F238E27FC236}">
                 <a16:creationId xmlns:a16="http://schemas.microsoft.com/office/drawing/2014/main" id="{2E612492-6C94-804D-A74D-9CDC207A2397}"/>
               </a:ext>
             </a:extLst>
@@ -6554,7 +7828,15 @@
             </a:r>
             <a:r>
               <a:rPr lang="en-US" dirty="0" err="1"/>
-              <a:t>iniciais</a:t>
+              <a:t>imprecisos</a:t>
+            </a:r>
+            <a:r>
+              <a:rPr lang="en-US" dirty="0"/>
+              <a:t> </a:t>
+            </a:r>
+            <a:r>
+              <a:rPr lang="en-US" dirty="0" err="1"/>
+              <a:t>ainda</a:t>
             </a:r>
             <a:endParaRPr lang="en-US" dirty="0"/>
           </a:p>
@@ -6576,7 +7858,7 @@
             <p:ph idx="1"/>
             <p:extLst>
               <p:ext uri="{D42A27DB-BD31-4B8C-83A1-F6EECF244321}">
-                <p14:modId xmlns:p14="http://schemas.microsoft.com/office/powerpoint/2010/main" val="634580382"/>
+                <p14:modId xmlns:p14="http://schemas.microsoft.com/office/powerpoint/2010/main" val="3709869092"/>
               </p:ext>
             </p:extLst>
           </p:nvPr>
@@ -6720,7 +8002,7 @@
                             <a:srgbClr val="FF0000"/>
                           </a:solidFill>
                         </a:rPr>
-                        <a:t>4%</a:t>
+                        <a:t>12% a 100%</a:t>
                       </a:r>
                     </a:p>
                   </a:txBody>
@@ -6981,7 +8263,7 @@
 </p:sld>
 </file>
 
-<file path=ppt/slides/slide19.xml><?xml version="1.0" encoding="utf-8"?>
+<file path=ppt/slides/slide2.xml><?xml version="1.0" encoding="utf-8"?>
 <p:sld xmlns:a="http://schemas.openxmlformats.org/drawingml/2006/main" xmlns:r="http://schemas.openxmlformats.org/officeDocument/2006/relationships" xmlns:p="http://schemas.openxmlformats.org/presentationml/2006/main">
   <p:cSld>
     <p:spTree>
@@ -7003,7 +8285,7 @@
           <p:cNvPr id="2" name="Title 1">
             <a:extLst>
               <a:ext uri="{FF2B5EF4-FFF2-40B4-BE49-F238E27FC236}">
-                <a16:creationId xmlns:a16="http://schemas.microsoft.com/office/drawing/2014/main" id="{2E612492-6C94-804D-A74D-9CDC207A2397}"/>
+                <a16:creationId xmlns:a16="http://schemas.microsoft.com/office/drawing/2014/main" id="{D7685F75-406E-4B45-A233-7E75B9F3F82A}"/>
               </a:ext>
             </a:extLst>
           </p:cNvPr>
@@ -7021,6 +8303,686 @@
           <a:p>
             <a:r>
               <a:rPr lang="en-US" dirty="0" err="1"/>
+              <a:t>Problema</a:t>
+            </a:r>
+            <a:r>
+              <a:rPr lang="en-US" dirty="0"/>
+              <a:t>:</a:t>
+            </a:r>
+          </a:p>
+        </p:txBody>
+      </p:sp>
+      <p:sp>
+        <p:nvSpPr>
+          <p:cNvPr id="3" name="Content Placeholder 2">
+            <a:extLst>
+              <a:ext uri="{FF2B5EF4-FFF2-40B4-BE49-F238E27FC236}">
+                <a16:creationId xmlns:a16="http://schemas.microsoft.com/office/drawing/2014/main" id="{A95C27CF-F127-F249-BE09-C85F3674842A}"/>
+              </a:ext>
+            </a:extLst>
+          </p:cNvPr>
+          <p:cNvSpPr>
+            <a:spLocks noGrp="1"/>
+          </p:cNvSpPr>
+          <p:nvPr>
+            <p:ph idx="1"/>
+          </p:nvPr>
+        </p:nvSpPr>
+        <p:spPr/>
+        <p:txBody>
+          <a:bodyPr>
+            <a:normAutofit fontScale="70000" lnSpcReduction="20000"/>
+          </a:bodyPr>
+          <a:lstStyle/>
+          <a:p>
+            <a:r>
+              <a:rPr lang="en-US" dirty="0"/>
+              <a:t>Given a question q and an answer candidate pool {a1, a2, ..., as} for that question (s is the pool size), the goal is to find the best answer candidate </a:t>
+            </a:r>
+            <a:r>
+              <a:rPr lang="en-US" dirty="0" err="1"/>
+              <a:t>ak</a:t>
+            </a:r>
+            <a:r>
+              <a:rPr lang="en-US" dirty="0"/>
+              <a:t>, 1 ≤ k ≤ s .</a:t>
+            </a:r>
+          </a:p>
+          <a:p>
+            <a:r>
+              <a:rPr lang="en-US" dirty="0" err="1"/>
+              <a:t>Vários</a:t>
+            </a:r>
+            <a:r>
+              <a:rPr lang="en-US" dirty="0"/>
+              <a:t> papers </a:t>
+            </a:r>
+            <a:r>
+              <a:rPr lang="en-US" dirty="0" err="1"/>
+              <a:t>aplicaram</a:t>
+            </a:r>
+            <a:r>
+              <a:rPr lang="en-US" dirty="0"/>
+              <a:t> </a:t>
+            </a:r>
+            <a:r>
+              <a:rPr lang="en-US" dirty="0" err="1"/>
+              <a:t>diversas</a:t>
+            </a:r>
+            <a:r>
+              <a:rPr lang="en-US" dirty="0"/>
+              <a:t> </a:t>
+            </a:r>
+            <a:r>
+              <a:rPr lang="en-US" dirty="0" err="1"/>
+              <a:t>técnicas</a:t>
+            </a:r>
+            <a:r>
+              <a:rPr lang="en-US" dirty="0"/>
+              <a:t> </a:t>
+            </a:r>
+            <a:r>
+              <a:rPr lang="en-US" dirty="0" err="1"/>
+              <a:t>neste</a:t>
+            </a:r>
+            <a:r>
+              <a:rPr lang="en-US" dirty="0"/>
+              <a:t> </a:t>
+            </a:r>
+            <a:r>
+              <a:rPr lang="en-US" dirty="0" err="1"/>
+              <a:t>problema</a:t>
+            </a:r>
+            <a:r>
+              <a:rPr lang="en-US" dirty="0"/>
+              <a:t>.</a:t>
+            </a:r>
+          </a:p>
+          <a:p>
+            <a:r>
+              <a:rPr lang="en-US" dirty="0"/>
+              <a:t>Segundo Yao et al., </a:t>
+            </a:r>
+            <a:r>
+              <a:rPr lang="en-US" dirty="0" err="1"/>
+              <a:t>não</a:t>
+            </a:r>
+            <a:r>
+              <a:rPr lang="en-US" dirty="0"/>
+              <a:t> </a:t>
+            </a:r>
+            <a:r>
+              <a:rPr lang="en-US" dirty="0" err="1"/>
+              <a:t>foram</a:t>
+            </a:r>
+            <a:r>
+              <a:rPr lang="en-US" dirty="0"/>
+              <a:t> </a:t>
+            </a:r>
+            <a:r>
+              <a:rPr lang="en-US" dirty="0" err="1"/>
+              <a:t>encontrados</a:t>
+            </a:r>
+            <a:r>
+              <a:rPr lang="en-US" dirty="0"/>
+              <a:t> papers </a:t>
+            </a:r>
+            <a:r>
+              <a:rPr lang="en-US" dirty="0" err="1"/>
+              <a:t>significativos</a:t>
+            </a:r>
+            <a:r>
+              <a:rPr lang="en-US" dirty="0"/>
+              <a:t> </a:t>
+            </a:r>
+            <a:r>
+              <a:rPr lang="en-US" dirty="0" err="1"/>
+              <a:t>aplicando</a:t>
+            </a:r>
+            <a:r>
+              <a:rPr lang="en-US" dirty="0"/>
+              <a:t> </a:t>
+            </a:r>
+            <a:r>
+              <a:rPr lang="en-US" dirty="0" err="1"/>
+              <a:t>estas</a:t>
+            </a:r>
+            <a:r>
+              <a:rPr lang="en-US" dirty="0"/>
+              <a:t> </a:t>
+            </a:r>
+            <a:r>
+              <a:rPr lang="en-US" dirty="0" err="1"/>
+              <a:t>técnicas</a:t>
+            </a:r>
+            <a:r>
+              <a:rPr lang="en-US" dirty="0"/>
+              <a:t> no dataset do </a:t>
+            </a:r>
+            <a:r>
+              <a:rPr lang="en-US" dirty="0" err="1"/>
+              <a:t>StackOverFlow</a:t>
+            </a:r>
+            <a:r>
+              <a:rPr lang="en-US" dirty="0"/>
+              <a:t>.</a:t>
+            </a:r>
+          </a:p>
+          <a:p>
+            <a:r>
+              <a:rPr lang="en-US" dirty="0"/>
+              <a:t>No paper “</a:t>
+            </a:r>
+            <a:r>
+              <a:rPr lang="en-US" dirty="0" err="1"/>
+              <a:t>StaQC</a:t>
+            </a:r>
+            <a:r>
+              <a:rPr lang="en-US" dirty="0"/>
+              <a:t>: A Systematically Mined Question-Code Dataset from Stack Overflow”, </a:t>
+            </a:r>
+            <a:r>
+              <a:rPr lang="en-US" dirty="0" err="1"/>
+              <a:t>ele</a:t>
+            </a:r>
+            <a:r>
+              <a:rPr lang="en-US" dirty="0"/>
+              <a:t> </a:t>
+            </a:r>
+            <a:r>
+              <a:rPr lang="en-US" dirty="0" err="1"/>
+              <a:t>aplica</a:t>
+            </a:r>
+            <a:r>
+              <a:rPr lang="en-US" dirty="0"/>
+              <a:t> </a:t>
+            </a:r>
+            <a:r>
+              <a:rPr lang="en-US" dirty="0" err="1"/>
+              <a:t>uma</a:t>
+            </a:r>
+            <a:r>
+              <a:rPr lang="en-US" dirty="0"/>
+              <a:t> </a:t>
+            </a:r>
+            <a:r>
+              <a:rPr lang="en-US" dirty="0" err="1"/>
+              <a:t>rede</a:t>
+            </a:r>
+            <a:r>
+              <a:rPr lang="en-US" dirty="0"/>
+              <a:t> neural </a:t>
+            </a:r>
+            <a:r>
+              <a:rPr lang="en-US" dirty="0" err="1"/>
+              <a:t>recorrente</a:t>
+            </a:r>
+            <a:r>
+              <a:rPr lang="en-US" dirty="0"/>
+              <a:t> LSTM para </a:t>
+            </a:r>
+            <a:r>
+              <a:rPr lang="en-US" dirty="0" err="1"/>
+              <a:t>aprender</a:t>
+            </a:r>
+            <a:r>
+              <a:rPr lang="en-US" dirty="0"/>
+              <a:t> a </a:t>
+            </a:r>
+            <a:r>
+              <a:rPr lang="en-US" dirty="0" err="1"/>
+              <a:t>selecionar</a:t>
+            </a:r>
+            <a:r>
+              <a:rPr lang="en-US" dirty="0"/>
+              <a:t> a </a:t>
+            </a:r>
+            <a:r>
+              <a:rPr lang="en-US" dirty="0" err="1"/>
+              <a:t>melhor</a:t>
+            </a:r>
+            <a:r>
+              <a:rPr lang="en-US" dirty="0"/>
+              <a:t> </a:t>
+            </a:r>
+            <a:r>
+              <a:rPr lang="en-US" dirty="0" err="1"/>
+              <a:t>resposta</a:t>
+            </a:r>
+            <a:r>
+              <a:rPr lang="en-US" dirty="0"/>
+              <a:t>.</a:t>
+            </a:r>
+          </a:p>
+          <a:p>
+            <a:r>
+              <a:rPr lang="en-US" dirty="0"/>
+              <a:t>No final, o </a:t>
+            </a:r>
+            <a:r>
+              <a:rPr lang="en-US" dirty="0" err="1"/>
+              <a:t>autor</a:t>
+            </a:r>
+            <a:r>
+              <a:rPr lang="en-US" dirty="0"/>
+              <a:t> </a:t>
+            </a:r>
+            <a:r>
+              <a:rPr lang="en-US" dirty="0" err="1"/>
+              <a:t>sugere</a:t>
+            </a:r>
+            <a:r>
+              <a:rPr lang="en-US" dirty="0"/>
+              <a:t> </a:t>
+            </a:r>
+            <a:r>
+              <a:rPr lang="en-US" dirty="0" err="1"/>
+              <a:t>como</a:t>
+            </a:r>
+            <a:r>
+              <a:rPr lang="en-US" dirty="0"/>
+              <a:t> </a:t>
+            </a:r>
+            <a:r>
+              <a:rPr lang="en-US" dirty="0" err="1"/>
+              <a:t>trabalho</a:t>
+            </a:r>
+            <a:r>
+              <a:rPr lang="en-US" dirty="0"/>
+              <a:t> </a:t>
+            </a:r>
+            <a:r>
+              <a:rPr lang="en-US" dirty="0" err="1"/>
+              <a:t>futuro</a:t>
+            </a:r>
+            <a:r>
+              <a:rPr lang="en-US" dirty="0"/>
+              <a:t> </a:t>
+            </a:r>
+            <a:r>
+              <a:rPr lang="en-US" dirty="0" err="1"/>
+              <a:t>verificar</a:t>
+            </a:r>
+            <a:r>
+              <a:rPr lang="en-US" dirty="0"/>
+              <a:t> o </a:t>
+            </a:r>
+            <a:r>
+              <a:rPr lang="en-US" dirty="0" err="1"/>
+              <a:t>comportamento</a:t>
+            </a:r>
+            <a:r>
+              <a:rPr lang="en-US" dirty="0"/>
+              <a:t> </a:t>
+            </a:r>
+            <a:r>
+              <a:rPr lang="en-US" dirty="0" err="1"/>
+              <a:t>utilizando</a:t>
+            </a:r>
+            <a:r>
+              <a:rPr lang="en-US" dirty="0"/>
+              <a:t> CNN e </a:t>
+            </a:r>
+            <a:r>
+              <a:rPr lang="en-US" dirty="0" err="1"/>
+              <a:t>outras</a:t>
+            </a:r>
+            <a:r>
+              <a:rPr lang="en-US" dirty="0"/>
+              <a:t> </a:t>
+            </a:r>
+            <a:r>
+              <a:rPr lang="en-US" dirty="0" err="1"/>
+              <a:t>técnicas</a:t>
+            </a:r>
+            <a:r>
+              <a:rPr lang="en-US" dirty="0"/>
+              <a:t>.</a:t>
+            </a:r>
+          </a:p>
+          <a:p>
+            <a:r>
+              <a:rPr lang="en-US" dirty="0"/>
+              <a:t>O dataset </a:t>
+            </a:r>
+            <a:r>
+              <a:rPr lang="en-US" dirty="0" err="1"/>
+              <a:t>é</a:t>
+            </a:r>
+            <a:r>
+              <a:rPr lang="en-US" dirty="0"/>
+              <a:t> </a:t>
+            </a:r>
+            <a:r>
+              <a:rPr lang="en-US" dirty="0" err="1"/>
+              <a:t>formado</a:t>
+            </a:r>
+            <a:r>
+              <a:rPr lang="en-US" dirty="0"/>
+              <a:t> </a:t>
+            </a:r>
+            <a:r>
+              <a:rPr lang="en-US" dirty="0" err="1"/>
+              <a:t>por</a:t>
+            </a:r>
+            <a:r>
+              <a:rPr lang="en-US" dirty="0"/>
+              <a:t> </a:t>
+            </a:r>
+            <a:r>
+              <a:rPr lang="en-US" dirty="0" err="1"/>
+              <a:t>questões</a:t>
+            </a:r>
+            <a:r>
+              <a:rPr lang="en-US" dirty="0"/>
+              <a:t> “How-to” de Python e SQL. São </a:t>
+            </a:r>
+            <a:r>
+              <a:rPr lang="en-US" dirty="0" err="1"/>
+              <a:t>questões</a:t>
+            </a:r>
+            <a:r>
+              <a:rPr lang="en-US" dirty="0"/>
+              <a:t> que </a:t>
+            </a:r>
+            <a:r>
+              <a:rPr lang="en-US" dirty="0" err="1"/>
+              <a:t>normalmente</a:t>
+            </a:r>
+            <a:r>
+              <a:rPr lang="en-US" dirty="0"/>
+              <a:t> a </a:t>
+            </a:r>
+            <a:r>
+              <a:rPr lang="en-US" dirty="0" err="1"/>
+              <a:t>resposta</a:t>
+            </a:r>
+            <a:r>
+              <a:rPr lang="en-US" dirty="0"/>
+              <a:t> </a:t>
+            </a:r>
+            <a:r>
+              <a:rPr lang="en-US" dirty="0" err="1"/>
+              <a:t>é</a:t>
+            </a:r>
+            <a:r>
+              <a:rPr lang="en-US" dirty="0"/>
+              <a:t> um code snippet. </a:t>
+            </a:r>
+            <a:r>
+              <a:rPr lang="en-US" dirty="0" err="1"/>
+              <a:t>Mais</a:t>
+            </a:r>
+            <a:r>
+              <a:rPr lang="en-US" dirty="0"/>
+              <a:t> de </a:t>
+            </a:r>
+            <a:r>
+              <a:rPr lang="en-US" dirty="0" err="1"/>
+              <a:t>uma</a:t>
+            </a:r>
+            <a:r>
+              <a:rPr lang="en-US" dirty="0"/>
+              <a:t> </a:t>
+            </a:r>
+            <a:r>
+              <a:rPr lang="en-US" dirty="0" err="1"/>
+              <a:t>resposta</a:t>
+            </a:r>
+            <a:r>
+              <a:rPr lang="en-US" dirty="0"/>
+              <a:t> </a:t>
+            </a:r>
+            <a:r>
+              <a:rPr lang="en-US" dirty="0" err="1"/>
+              <a:t>correta</a:t>
+            </a:r>
+            <a:r>
+              <a:rPr lang="en-US" dirty="0"/>
+              <a:t> </a:t>
+            </a:r>
+            <a:r>
+              <a:rPr lang="en-US" dirty="0" err="1"/>
+              <a:t>é</a:t>
+            </a:r>
+            <a:r>
+              <a:rPr lang="en-US" dirty="0"/>
+              <a:t> </a:t>
+            </a:r>
+            <a:r>
+              <a:rPr lang="en-US" dirty="0" err="1"/>
+              <a:t>possível</a:t>
+            </a:r>
+            <a:r>
+              <a:rPr lang="en-US" dirty="0"/>
+              <a:t> para </a:t>
+            </a:r>
+            <a:r>
+              <a:rPr lang="en-US" dirty="0" err="1"/>
+              <a:t>uma</a:t>
+            </a:r>
+            <a:r>
+              <a:rPr lang="en-US" dirty="0"/>
+              <a:t> </a:t>
+            </a:r>
+            <a:r>
+              <a:rPr lang="en-US" dirty="0" err="1"/>
+              <a:t>mesma</a:t>
+            </a:r>
+            <a:r>
+              <a:rPr lang="en-US" dirty="0"/>
+              <a:t> </a:t>
+            </a:r>
+            <a:r>
+              <a:rPr lang="en-US" dirty="0" err="1"/>
+              <a:t>pergunta</a:t>
+            </a:r>
+            <a:r>
+              <a:rPr lang="en-US" dirty="0"/>
+              <a:t>.</a:t>
+            </a:r>
+          </a:p>
+          <a:p>
+            <a:r>
+              <a:rPr lang="en-US" dirty="0" err="1"/>
+              <a:t>Após</a:t>
+            </a:r>
+            <a:r>
+              <a:rPr lang="en-US" dirty="0"/>
+              <a:t> </a:t>
+            </a:r>
+            <a:r>
+              <a:rPr lang="en-US" dirty="0" err="1"/>
+              <a:t>extrair</a:t>
+            </a:r>
+            <a:r>
+              <a:rPr lang="en-US" dirty="0"/>
+              <a:t> do stack over flow as </a:t>
+            </a:r>
+            <a:r>
+              <a:rPr lang="en-US" dirty="0" err="1"/>
+              <a:t>perguntas</a:t>
+            </a:r>
+            <a:r>
+              <a:rPr lang="en-US" dirty="0"/>
+              <a:t> “How-to” de Python, </a:t>
+            </a:r>
+            <a:r>
+              <a:rPr lang="en-US" dirty="0" err="1"/>
+              <a:t>por</a:t>
+            </a:r>
+            <a:r>
+              <a:rPr lang="en-US" dirty="0"/>
+              <a:t> </a:t>
+            </a:r>
+            <a:r>
+              <a:rPr lang="en-US" dirty="0" err="1"/>
+              <a:t>exemplo</a:t>
+            </a:r>
+            <a:r>
+              <a:rPr lang="en-US" dirty="0"/>
+              <a:t>, 3 </a:t>
+            </a:r>
+            <a:r>
+              <a:rPr lang="en-US" dirty="0" err="1"/>
+              <a:t>alunos</a:t>
+            </a:r>
+            <a:r>
+              <a:rPr lang="en-US" dirty="0"/>
+              <a:t> de </a:t>
+            </a:r>
+            <a:r>
+              <a:rPr lang="en-US" dirty="0" err="1"/>
+              <a:t>gradução</a:t>
+            </a:r>
+            <a:r>
+              <a:rPr lang="en-US" dirty="0"/>
+              <a:t> da </a:t>
+            </a:r>
+            <a:r>
+              <a:rPr lang="en-US" dirty="0" err="1"/>
+              <a:t>universidade</a:t>
+            </a:r>
+            <a:r>
+              <a:rPr lang="en-US" dirty="0"/>
+              <a:t> </a:t>
+            </a:r>
+            <a:r>
+              <a:rPr lang="en-US" dirty="0" err="1"/>
+              <a:t>marcaram</a:t>
+            </a:r>
+            <a:r>
+              <a:rPr lang="en-US" dirty="0"/>
+              <a:t> </a:t>
+            </a:r>
+            <a:r>
+              <a:rPr lang="en-US" dirty="0" err="1"/>
+              <a:t>quais</a:t>
+            </a:r>
+            <a:r>
+              <a:rPr lang="en-US" dirty="0"/>
+              <a:t> </a:t>
+            </a:r>
+            <a:r>
+              <a:rPr lang="en-US" dirty="0" err="1"/>
+              <a:t>respostas</a:t>
+            </a:r>
+            <a:r>
+              <a:rPr lang="en-US" dirty="0"/>
+              <a:t> </a:t>
+            </a:r>
+            <a:r>
+              <a:rPr lang="en-US" dirty="0" err="1"/>
+              <a:t>estavam</a:t>
+            </a:r>
+            <a:r>
+              <a:rPr lang="en-US" dirty="0"/>
+              <a:t> </a:t>
+            </a:r>
+            <a:r>
+              <a:rPr lang="en-US" dirty="0" err="1"/>
+              <a:t>certas</a:t>
+            </a:r>
+            <a:r>
+              <a:rPr lang="en-US" dirty="0"/>
+              <a:t> </a:t>
+            </a:r>
+            <a:r>
+              <a:rPr lang="en-US" dirty="0" err="1"/>
+              <a:t>ou</a:t>
+            </a:r>
+            <a:r>
+              <a:rPr lang="en-US" dirty="0"/>
+              <a:t> </a:t>
+            </a:r>
+            <a:r>
+              <a:rPr lang="en-US" dirty="0" err="1"/>
+              <a:t>erradas</a:t>
+            </a:r>
+            <a:r>
+              <a:rPr lang="en-US" dirty="0"/>
+              <a:t>. </a:t>
+            </a:r>
+            <a:r>
+              <a:rPr lang="en-US" dirty="0" err="1"/>
+              <a:t>Foram</a:t>
+            </a:r>
+            <a:r>
+              <a:rPr lang="en-US" dirty="0"/>
+              <a:t> </a:t>
+            </a:r>
+            <a:r>
+              <a:rPr lang="en-US" dirty="0" err="1"/>
+              <a:t>marcadas</a:t>
+            </a:r>
+            <a:r>
+              <a:rPr lang="en-US" dirty="0"/>
+              <a:t> um total de 4845 </a:t>
+            </a:r>
+            <a:r>
+              <a:rPr lang="en-US" dirty="0" err="1"/>
+              <a:t>respostas</a:t>
+            </a:r>
+            <a:r>
+              <a:rPr lang="en-US" dirty="0"/>
+              <a:t> para Python.</a:t>
+            </a:r>
+          </a:p>
+        </p:txBody>
+      </p:sp>
+    </p:spTree>
+    <p:extLst>
+      <p:ext uri="{BB962C8B-B14F-4D97-AF65-F5344CB8AC3E}">
+        <p14:creationId xmlns:p14="http://schemas.microsoft.com/office/powerpoint/2010/main" val="741761872"/>
+      </p:ext>
+    </p:extLst>
+  </p:cSld>
+  <p:clrMapOvr>
+    <a:masterClrMapping/>
+  </p:clrMapOvr>
+</p:sld>
+</file>
+
+<file path=ppt/slides/slide20.xml><?xml version="1.0" encoding="utf-8"?>
+<p:sld xmlns:a="http://schemas.openxmlformats.org/drawingml/2006/main" xmlns:r="http://schemas.openxmlformats.org/officeDocument/2006/relationships" xmlns:p="http://schemas.openxmlformats.org/presentationml/2006/main">
+  <p:cSld>
+    <p:spTree>
+      <p:nvGrpSpPr>
+        <p:cNvPr id="1" name=""/>
+        <p:cNvGrpSpPr/>
+        <p:nvPr/>
+      </p:nvGrpSpPr>
+      <p:grpSpPr>
+        <a:xfrm>
+          <a:off x="0" y="0"/>
+          <a:ext cx="0" cy="0"/>
+          <a:chOff x="0" y="0"/>
+          <a:chExt cx="0" cy="0"/>
+        </a:xfrm>
+      </p:grpSpPr>
+      <p:sp>
+        <p:nvSpPr>
+          <p:cNvPr id="2" name="Title 1">
+            <a:extLst>
+              <a:ext uri="{FF2B5EF4-FFF2-40B4-BE49-F238E27FC236}">
+                <a16:creationId xmlns:a16="http://schemas.microsoft.com/office/drawing/2014/main" id="{2E612492-6C94-804D-A74D-9CDC207A2397}"/>
+              </a:ext>
+            </a:extLst>
+          </p:cNvPr>
+          <p:cNvSpPr>
+            <a:spLocks noGrp="1"/>
+          </p:cNvSpPr>
+          <p:nvPr>
+            <p:ph type="title"/>
+          </p:nvPr>
+        </p:nvSpPr>
+        <p:spPr/>
+        <p:txBody>
+          <a:bodyPr/>
+          <a:lstStyle/>
+          <a:p>
+            <a:r>
+              <a:rPr lang="en-US" dirty="0" err="1"/>
               <a:t>Comentários</a:t>
             </a:r>
             <a:r>
@@ -7073,6 +9035,11 @@
           </p:cNvGraphicFramePr>
           <p:nvPr>
             <p:ph idx="1"/>
+            <p:extLst>
+              <p:ext uri="{D42A27DB-BD31-4B8C-83A1-F6EECF244321}">
+                <p14:modId xmlns:p14="http://schemas.microsoft.com/office/powerpoint/2010/main" val="3884695702"/>
+              </p:ext>
+            </p:extLst>
           </p:nvPr>
         </p:nvGraphicFramePr>
         <p:xfrm>
@@ -7214,7 +9181,7 @@
                             <a:srgbClr val="FF0000"/>
                           </a:solidFill>
                         </a:rPr>
-                        <a:t>4%</a:t>
+                        <a:t>12% a 100%</a:t>
                       </a:r>
                     </a:p>
                   </a:txBody>
@@ -7296,7 +9263,7 @@
         <p:spPr>
           <a:xfrm>
             <a:off x="838200" y="3962400"/>
-            <a:ext cx="10515600" cy="3139321"/>
+            <a:ext cx="10515600" cy="1754326"/>
           </a:xfrm>
           <a:prstGeom prst="rect">
             <a:avLst/>
@@ -7315,125 +9282,107 @@
             </a:pPr>
             <a:r>
               <a:rPr lang="en-US" dirty="0"/>
-              <a:t>A </a:t>
-            </a:r>
-            <a:r>
-              <a:rPr lang="en-US" dirty="0" err="1"/>
-              <a:t>precisão</a:t>
-            </a:r>
-            <a:r>
-              <a:rPr lang="en-US" dirty="0"/>
-              <a:t> </a:t>
-            </a:r>
-            <a:r>
-              <a:rPr lang="en-US" dirty="0" err="1"/>
-              <a:t>foi</a:t>
-            </a:r>
-            <a:r>
-              <a:rPr lang="en-US" dirty="0"/>
-              <a:t> de </a:t>
-            </a:r>
-            <a:r>
-              <a:rPr lang="en-US" dirty="0" err="1"/>
-              <a:t>apenas</a:t>
-            </a:r>
-            <a:r>
-              <a:rPr lang="en-US" dirty="0"/>
-              <a:t> 4%. Eu </a:t>
-            </a:r>
-            <a:r>
-              <a:rPr lang="en-US" dirty="0" err="1"/>
-              <a:t>acredito</a:t>
-            </a:r>
-            <a:r>
-              <a:rPr lang="en-US" dirty="0"/>
-              <a:t> que um dos </a:t>
-            </a:r>
-            <a:r>
-              <a:rPr lang="en-US" dirty="0" err="1"/>
-              <a:t>motivos</a:t>
-            </a:r>
-            <a:r>
-              <a:rPr lang="en-US" dirty="0"/>
-              <a:t> </a:t>
-            </a:r>
-            <a:r>
-              <a:rPr lang="en-US" dirty="0" err="1"/>
-              <a:t>foi</a:t>
-            </a:r>
-            <a:r>
-              <a:rPr lang="en-US" dirty="0"/>
-              <a:t> a </a:t>
-            </a:r>
-            <a:r>
-              <a:rPr lang="en-US" dirty="0" err="1"/>
-              <a:t>alteração</a:t>
-            </a:r>
-            <a:r>
-              <a:rPr lang="en-US" dirty="0"/>
-              <a:t> que </a:t>
-            </a:r>
-            <a:r>
-              <a:rPr lang="en-US" dirty="0" err="1"/>
-              <a:t>eu</a:t>
-            </a:r>
-            <a:r>
-              <a:rPr lang="en-US" dirty="0"/>
-              <a:t> </a:t>
-            </a:r>
-            <a:r>
-              <a:rPr lang="en-US" dirty="0" err="1"/>
-              <a:t>fiz</a:t>
-            </a:r>
-            <a:r>
-              <a:rPr lang="en-US" dirty="0"/>
-              <a:t> para </a:t>
-            </a:r>
-            <a:r>
-              <a:rPr lang="en-US" dirty="0" err="1"/>
-              <a:t>calcular</a:t>
-            </a:r>
-            <a:r>
-              <a:rPr lang="en-US" dirty="0"/>
-              <a:t> a </a:t>
-            </a:r>
-            <a:r>
-              <a:rPr lang="en-US" dirty="0" err="1"/>
-              <a:t>função</a:t>
-            </a:r>
-            <a:r>
-              <a:rPr lang="en-US" dirty="0"/>
-              <a:t> de Cosine Similarity.</a:t>
-            </a:r>
-          </a:p>
-          <a:p>
-            <a:pPr marL="285750" indent="-285750">
-              <a:buFont typeface="Arial" panose="020B0604020202020204" pitchFamily="34" charset="0"/>
-              <a:buChar char="•"/>
-            </a:pPr>
-            <a:r>
-              <a:rPr lang="en-US" dirty="0"/>
-              <a:t>O </a:t>
-            </a:r>
-            <a:r>
-              <a:rPr lang="en-US" dirty="0" err="1"/>
-              <a:t>código</a:t>
-            </a:r>
-            <a:r>
-              <a:rPr lang="en-US" dirty="0"/>
-              <a:t> </a:t>
-            </a:r>
-            <a:r>
-              <a:rPr lang="en-US" dirty="0" err="1"/>
-              <a:t>inicial</a:t>
-            </a:r>
-            <a:r>
-              <a:rPr lang="en-US" dirty="0"/>
-              <a:t> </a:t>
-            </a:r>
-            <a:r>
-              <a:rPr lang="en-US" dirty="0" err="1"/>
-              <a:t>utilizava</a:t>
+              <a:t>O dataset </a:t>
+            </a:r>
+            <a:r>
+              <a:rPr lang="en-US" dirty="0" err="1"/>
+              <a:t>é</a:t>
+            </a:r>
+            <a:r>
+              <a:rPr lang="en-US" dirty="0"/>
+              <a:t> </a:t>
+            </a:r>
+            <a:r>
+              <a:rPr lang="en-US" dirty="0" err="1"/>
+              <a:t>pequeno</a:t>
+            </a:r>
+            <a:r>
+              <a:rPr lang="en-US" dirty="0"/>
+              <a:t>, </a:t>
+            </a:r>
+            <a:r>
+              <a:rPr lang="en-US" dirty="0" err="1"/>
+              <a:t>ocorre</a:t>
+            </a:r>
+            <a:r>
+              <a:rPr lang="en-US" dirty="0"/>
+              <a:t> overfitting </a:t>
+            </a:r>
+            <a:r>
+              <a:rPr lang="en-US" dirty="0" err="1"/>
+              <a:t>muito</a:t>
+            </a:r>
+            <a:r>
+              <a:rPr lang="en-US" dirty="0"/>
+              <a:t> </a:t>
+            </a:r>
+            <a:r>
+              <a:rPr lang="en-US" dirty="0" err="1"/>
+              <a:t>rápido</a:t>
+            </a:r>
+            <a:r>
+              <a:rPr lang="en-US" dirty="0"/>
+              <a:t>. </a:t>
+            </a:r>
+            <a:r>
+              <a:rPr lang="en-US" dirty="0" err="1"/>
+              <a:t>Infelizmente</a:t>
+            </a:r>
+            <a:r>
+              <a:rPr lang="en-US" dirty="0"/>
+              <a:t>, </a:t>
+            </a:r>
+            <a:r>
+              <a:rPr lang="en-US" dirty="0" err="1"/>
+              <a:t>fui</a:t>
+            </a:r>
+            <a:r>
+              <a:rPr lang="en-US" dirty="0"/>
+              <a:t> </a:t>
+            </a:r>
+            <a:r>
+              <a:rPr lang="en-US" dirty="0" err="1"/>
+              <a:t>testando</a:t>
+            </a:r>
+            <a:r>
+              <a:rPr lang="en-US" dirty="0"/>
+              <a:t> </a:t>
+            </a:r>
+            <a:r>
+              <a:rPr lang="en-US" dirty="0" err="1"/>
+              <a:t>os</a:t>
+            </a:r>
+            <a:r>
+              <a:rPr lang="en-US" dirty="0"/>
+              <a:t> </a:t>
+            </a:r>
+            <a:r>
+              <a:rPr lang="en-US" dirty="0" err="1"/>
+              <a:t>parâmetros</a:t>
+            </a:r>
+            <a:r>
+              <a:rPr lang="en-US" dirty="0"/>
+              <a:t> e </a:t>
+            </a:r>
+            <a:r>
+              <a:rPr lang="en-US" dirty="0" err="1"/>
+              <a:t>nao</a:t>
+            </a:r>
+            <a:r>
+              <a:rPr lang="en-US" dirty="0"/>
+              <a:t> </a:t>
+            </a:r>
+            <a:r>
+              <a:rPr lang="en-US" dirty="0" err="1"/>
+              <a:t>fui</a:t>
+            </a:r>
+            <a:r>
+              <a:rPr lang="en-US" dirty="0"/>
+              <a:t> </a:t>
+            </a:r>
+            <a:r>
+              <a:rPr lang="en-US" dirty="0" err="1"/>
+              <a:t>catalogando</a:t>
             </a:r>
             <a:r>
               <a:rPr lang="en-US" dirty="0"/>
@@ -7441,20 +9390,15 @@
             </a:r>
             <a:r>
               <a:rPr lang="en-US" dirty="0" err="1"/>
-              <a:t>código</a:t>
-            </a:r>
-            <a:r>
-              <a:rPr lang="en-US" dirty="0"/>
-              <a:t> </a:t>
-            </a:r>
-            <a:r>
-              <a:rPr lang="en-US" dirty="0" err="1"/>
-              <a:t>abaixo</a:t>
-            </a:r>
-            <a:r>
-              <a:rPr lang="en-US" dirty="0"/>
-              <a:t>:</a:t>
-            </a:r>
+              <a:t>histórico</a:t>
+            </a:r>
+            <a:r>
+              <a:rPr lang="en-US" dirty="0"/>
+              <a:t>. </a:t>
+            </a:r>
+          </a:p>
+          <a:p>
+            <a:endParaRPr lang="en-US" dirty="0"/>
           </a:p>
           <a:p>
             <a:pPr marL="285750" indent="-285750">
@@ -7464,12 +9408,6 @@
             <a:endParaRPr lang="en-US" dirty="0"/>
           </a:p>
           <a:p>
-            <a:endParaRPr lang="en-US" dirty="0"/>
-          </a:p>
-          <a:p>
-            <a:endParaRPr lang="en-US" dirty="0"/>
-          </a:p>
-          <a:p>
             <a:pPr marL="285750" indent="-285750">
               <a:buFont typeface="Arial" panose="020B0604020202020204" pitchFamily="34" charset="0"/>
               <a:buChar char="•"/>
@@ -7481,1302 +9419,14 @@
               <a:buFont typeface="Arial" panose="020B0604020202020204" pitchFamily="34" charset="0"/>
               <a:buChar char="•"/>
             </a:pPr>
-            <a:r>
-              <a:rPr lang="en-US" dirty="0"/>
-              <a:t>O meu </a:t>
-            </a:r>
-            <a:r>
-              <a:rPr lang="en-US" dirty="0" err="1"/>
-              <a:t>código</a:t>
-            </a:r>
-            <a:r>
-              <a:rPr lang="en-US" dirty="0"/>
-              <a:t> </a:t>
-            </a:r>
-            <a:r>
-              <a:rPr lang="en-US" dirty="0" err="1"/>
-              <a:t>passou</a:t>
-            </a:r>
-            <a:r>
-              <a:rPr lang="en-US" dirty="0"/>
-              <a:t> a </a:t>
-            </a:r>
-            <a:r>
-              <a:rPr lang="en-US" dirty="0" err="1"/>
-              <a:t>calcular</a:t>
-            </a:r>
-            <a:r>
-              <a:rPr lang="en-US" dirty="0"/>
-              <a:t> da </a:t>
-            </a:r>
-            <a:r>
-              <a:rPr lang="en-US" dirty="0" err="1"/>
-              <a:t>seguinte</a:t>
-            </a:r>
-            <a:r>
-              <a:rPr lang="en-US" dirty="0"/>
-              <a:t> </a:t>
-            </a:r>
-            <a:r>
-              <a:rPr lang="en-US" dirty="0" err="1"/>
-              <a:t>maneira</a:t>
-            </a:r>
-            <a:r>
-              <a:rPr lang="en-US" dirty="0"/>
-              <a:t>:</a:t>
-            </a:r>
-          </a:p>
-          <a:p>
-            <a:pPr marL="285750" indent="-285750">
-              <a:buFont typeface="Arial" panose="020B0604020202020204" pitchFamily="34" charset="0"/>
-              <a:buChar char="•"/>
-            </a:pPr>
             <a:endParaRPr lang="en-US" dirty="0"/>
-          </a:p>
-          <a:p>
-            <a:pPr marL="285750" indent="-285750">
-              <a:buFont typeface="Arial" panose="020B0604020202020204" pitchFamily="34" charset="0"/>
-              <a:buChar char="•"/>
-            </a:pPr>
-            <a:endParaRPr lang="en-US" dirty="0"/>
-          </a:p>
-          <a:p>
-            <a:pPr marL="285750" indent="-285750">
-              <a:buFont typeface="Arial" panose="020B0604020202020204" pitchFamily="34" charset="0"/>
-              <a:buChar char="•"/>
-            </a:pPr>
-            <a:endParaRPr lang="en-US" dirty="0"/>
-          </a:p>
-        </p:txBody>
-      </p:sp>
-      <p:pic>
-        <p:nvPicPr>
-          <p:cNvPr id="9" name="Picture 8">
-            <a:extLst>
-              <a:ext uri="{FF2B5EF4-FFF2-40B4-BE49-F238E27FC236}">
-                <a16:creationId xmlns:a16="http://schemas.microsoft.com/office/drawing/2014/main" id="{ED979348-B288-6E40-BE1E-1241D43D3EAE}"/>
-              </a:ext>
-            </a:extLst>
-          </p:cNvPr>
-          <p:cNvPicPr>
-            <a:picLocks noChangeAspect="1"/>
-          </p:cNvPicPr>
-          <p:nvPr/>
-        </p:nvPicPr>
-        <p:blipFill>
-          <a:blip r:embed="rId2"/>
-          <a:stretch>
-            <a:fillRect/>
-          </a:stretch>
-        </p:blipFill>
-        <p:spPr>
-          <a:xfrm>
-            <a:off x="838200" y="4904611"/>
-            <a:ext cx="9702800" cy="977900"/>
-          </a:xfrm>
-          <a:prstGeom prst="rect">
-            <a:avLst/>
-          </a:prstGeom>
-        </p:spPr>
-      </p:pic>
-      <p:pic>
-        <p:nvPicPr>
-          <p:cNvPr id="11" name="Picture 10">
-            <a:extLst>
-              <a:ext uri="{FF2B5EF4-FFF2-40B4-BE49-F238E27FC236}">
-                <a16:creationId xmlns:a16="http://schemas.microsoft.com/office/drawing/2014/main" id="{34E565FD-B9C4-F04A-BC86-ECE79B6DF728}"/>
-              </a:ext>
-            </a:extLst>
-          </p:cNvPr>
-          <p:cNvPicPr>
-            <a:picLocks noChangeAspect="1"/>
-          </p:cNvPicPr>
-          <p:nvPr/>
-        </p:nvPicPr>
-        <p:blipFill>
-          <a:blip r:embed="rId3"/>
-          <a:stretch>
-            <a:fillRect/>
-          </a:stretch>
-        </p:blipFill>
-        <p:spPr>
-          <a:xfrm>
-            <a:off x="1276350" y="6333366"/>
-            <a:ext cx="7912100" cy="317500"/>
-          </a:xfrm>
-          <a:prstGeom prst="rect">
-            <a:avLst/>
-          </a:prstGeom>
-        </p:spPr>
-      </p:pic>
-    </p:spTree>
-    <p:extLst>
-      <p:ext uri="{BB962C8B-B14F-4D97-AF65-F5344CB8AC3E}">
-        <p14:creationId xmlns:p14="http://schemas.microsoft.com/office/powerpoint/2010/main" val="2341116043"/>
-      </p:ext>
-    </p:extLst>
-  </p:cSld>
-  <p:clrMapOvr>
-    <a:masterClrMapping/>
-  </p:clrMapOvr>
-</p:sld>
-</file>
-
-<file path=ppt/slides/slide2.xml><?xml version="1.0" encoding="utf-8"?>
-<p:sld xmlns:a="http://schemas.openxmlformats.org/drawingml/2006/main" xmlns:r="http://schemas.openxmlformats.org/officeDocument/2006/relationships" xmlns:p="http://schemas.openxmlformats.org/presentationml/2006/main">
-  <p:cSld>
-    <p:spTree>
-      <p:nvGrpSpPr>
-        <p:cNvPr id="1" name=""/>
-        <p:cNvGrpSpPr/>
-        <p:nvPr/>
-      </p:nvGrpSpPr>
-      <p:grpSpPr>
-        <a:xfrm>
-          <a:off x="0" y="0"/>
-          <a:ext cx="0" cy="0"/>
-          <a:chOff x="0" y="0"/>
-          <a:chExt cx="0" cy="0"/>
-        </a:xfrm>
-      </p:grpSpPr>
-      <p:sp>
-        <p:nvSpPr>
-          <p:cNvPr id="2" name="Title 1">
-            <a:extLst>
-              <a:ext uri="{FF2B5EF4-FFF2-40B4-BE49-F238E27FC236}">
-                <a16:creationId xmlns:a16="http://schemas.microsoft.com/office/drawing/2014/main" id="{D7685F75-406E-4B45-A233-7E75B9F3F82A}"/>
-              </a:ext>
-            </a:extLst>
-          </p:cNvPr>
-          <p:cNvSpPr>
-            <a:spLocks noGrp="1"/>
-          </p:cNvSpPr>
-          <p:nvPr>
-            <p:ph type="title"/>
-          </p:nvPr>
-        </p:nvSpPr>
-        <p:spPr/>
-        <p:txBody>
-          <a:bodyPr/>
-          <a:lstStyle/>
-          <a:p>
-            <a:r>
-              <a:rPr lang="en-US" dirty="0" err="1"/>
-              <a:t>Problema</a:t>
-            </a:r>
-            <a:r>
-              <a:rPr lang="en-US" dirty="0"/>
-              <a:t>:</a:t>
-            </a:r>
-          </a:p>
-        </p:txBody>
-      </p:sp>
-      <p:sp>
-        <p:nvSpPr>
-          <p:cNvPr id="3" name="Content Placeholder 2">
-            <a:extLst>
-              <a:ext uri="{FF2B5EF4-FFF2-40B4-BE49-F238E27FC236}">
-                <a16:creationId xmlns:a16="http://schemas.microsoft.com/office/drawing/2014/main" id="{A95C27CF-F127-F249-BE09-C85F3674842A}"/>
-              </a:ext>
-            </a:extLst>
-          </p:cNvPr>
-          <p:cNvSpPr>
-            <a:spLocks noGrp="1"/>
-          </p:cNvSpPr>
-          <p:nvPr>
-            <p:ph idx="1"/>
-          </p:nvPr>
-        </p:nvSpPr>
-        <p:spPr/>
-        <p:txBody>
-          <a:bodyPr>
-            <a:normAutofit fontScale="70000" lnSpcReduction="20000"/>
-          </a:bodyPr>
-          <a:lstStyle/>
-          <a:p>
-            <a:r>
-              <a:rPr lang="en-US" dirty="0"/>
-              <a:t>Given a question q and an answer candidate pool {a1, a2, ..., as} for that question (s is the pool size), the goal is to find the best answer candidate </a:t>
-            </a:r>
-            <a:r>
-              <a:rPr lang="en-US" dirty="0" err="1"/>
-              <a:t>ak</a:t>
-            </a:r>
-            <a:r>
-              <a:rPr lang="en-US" dirty="0"/>
-              <a:t>, 1 ≤ k ≤ s .</a:t>
-            </a:r>
-          </a:p>
-          <a:p>
-            <a:r>
-              <a:rPr lang="en-US" dirty="0" err="1"/>
-              <a:t>Vários</a:t>
-            </a:r>
-            <a:r>
-              <a:rPr lang="en-US" dirty="0"/>
-              <a:t> papers </a:t>
-            </a:r>
-            <a:r>
-              <a:rPr lang="en-US" dirty="0" err="1"/>
-              <a:t>aplicaram</a:t>
-            </a:r>
-            <a:r>
-              <a:rPr lang="en-US" dirty="0"/>
-              <a:t> </a:t>
-            </a:r>
-            <a:r>
-              <a:rPr lang="en-US" dirty="0" err="1"/>
-              <a:t>diversas</a:t>
-            </a:r>
-            <a:r>
-              <a:rPr lang="en-US" dirty="0"/>
-              <a:t> </a:t>
-            </a:r>
-            <a:r>
-              <a:rPr lang="en-US" dirty="0" err="1"/>
-              <a:t>técnicas</a:t>
-            </a:r>
-            <a:r>
-              <a:rPr lang="en-US" dirty="0"/>
-              <a:t> </a:t>
-            </a:r>
-            <a:r>
-              <a:rPr lang="en-US" dirty="0" err="1"/>
-              <a:t>neste</a:t>
-            </a:r>
-            <a:r>
-              <a:rPr lang="en-US" dirty="0"/>
-              <a:t> </a:t>
-            </a:r>
-            <a:r>
-              <a:rPr lang="en-US" dirty="0" err="1"/>
-              <a:t>problema</a:t>
-            </a:r>
-            <a:r>
-              <a:rPr lang="en-US" dirty="0"/>
-              <a:t>.</a:t>
-            </a:r>
-          </a:p>
-          <a:p>
-            <a:r>
-              <a:rPr lang="en-US" dirty="0"/>
-              <a:t>Segundo Yao et al., </a:t>
-            </a:r>
-            <a:r>
-              <a:rPr lang="en-US" dirty="0" err="1"/>
-              <a:t>não</a:t>
-            </a:r>
-            <a:r>
-              <a:rPr lang="en-US" dirty="0"/>
-              <a:t> </a:t>
-            </a:r>
-            <a:r>
-              <a:rPr lang="en-US" dirty="0" err="1"/>
-              <a:t>foram</a:t>
-            </a:r>
-            <a:r>
-              <a:rPr lang="en-US" dirty="0"/>
-              <a:t> </a:t>
-            </a:r>
-            <a:r>
-              <a:rPr lang="en-US" dirty="0" err="1"/>
-              <a:t>encontrados</a:t>
-            </a:r>
-            <a:r>
-              <a:rPr lang="en-US" dirty="0"/>
-              <a:t> papers </a:t>
-            </a:r>
-            <a:r>
-              <a:rPr lang="en-US" dirty="0" err="1"/>
-              <a:t>significativos</a:t>
-            </a:r>
-            <a:r>
-              <a:rPr lang="en-US" dirty="0"/>
-              <a:t> </a:t>
-            </a:r>
-            <a:r>
-              <a:rPr lang="en-US" dirty="0" err="1"/>
-              <a:t>aplicando</a:t>
-            </a:r>
-            <a:r>
-              <a:rPr lang="en-US" dirty="0"/>
-              <a:t> </a:t>
-            </a:r>
-            <a:r>
-              <a:rPr lang="en-US" dirty="0" err="1"/>
-              <a:t>estas</a:t>
-            </a:r>
-            <a:r>
-              <a:rPr lang="en-US" dirty="0"/>
-              <a:t> </a:t>
-            </a:r>
-            <a:r>
-              <a:rPr lang="en-US" dirty="0" err="1"/>
-              <a:t>técnicas</a:t>
-            </a:r>
-            <a:r>
-              <a:rPr lang="en-US" dirty="0"/>
-              <a:t> no dataset do </a:t>
-            </a:r>
-            <a:r>
-              <a:rPr lang="en-US" dirty="0" err="1"/>
-              <a:t>StackOverFlow</a:t>
-            </a:r>
-            <a:r>
-              <a:rPr lang="en-US" dirty="0"/>
-              <a:t>.</a:t>
-            </a:r>
-          </a:p>
-          <a:p>
-            <a:r>
-              <a:rPr lang="en-US" dirty="0"/>
-              <a:t>No paper “</a:t>
-            </a:r>
-            <a:r>
-              <a:rPr lang="en-US" dirty="0" err="1"/>
-              <a:t>StaQC</a:t>
-            </a:r>
-            <a:r>
-              <a:rPr lang="en-US" dirty="0"/>
-              <a:t>: A Systematically Mined Question-Code Dataset from Stack Overflow”, </a:t>
-            </a:r>
-            <a:r>
-              <a:rPr lang="en-US" dirty="0" err="1"/>
-              <a:t>ele</a:t>
-            </a:r>
-            <a:r>
-              <a:rPr lang="en-US" dirty="0"/>
-              <a:t> </a:t>
-            </a:r>
-            <a:r>
-              <a:rPr lang="en-US" dirty="0" err="1"/>
-              <a:t>aplica</a:t>
-            </a:r>
-            <a:r>
-              <a:rPr lang="en-US" dirty="0"/>
-              <a:t> </a:t>
-            </a:r>
-            <a:r>
-              <a:rPr lang="en-US" dirty="0" err="1"/>
-              <a:t>uma</a:t>
-            </a:r>
-            <a:r>
-              <a:rPr lang="en-US" dirty="0"/>
-              <a:t> </a:t>
-            </a:r>
-            <a:r>
-              <a:rPr lang="en-US" dirty="0" err="1"/>
-              <a:t>rede</a:t>
-            </a:r>
-            <a:r>
-              <a:rPr lang="en-US" dirty="0"/>
-              <a:t> neural </a:t>
-            </a:r>
-            <a:r>
-              <a:rPr lang="en-US" dirty="0" err="1"/>
-              <a:t>recorrente</a:t>
-            </a:r>
-            <a:r>
-              <a:rPr lang="en-US" dirty="0"/>
-              <a:t> LSTM para </a:t>
-            </a:r>
-            <a:r>
-              <a:rPr lang="en-US" dirty="0" err="1"/>
-              <a:t>aprender</a:t>
-            </a:r>
-            <a:r>
-              <a:rPr lang="en-US" dirty="0"/>
-              <a:t> a </a:t>
-            </a:r>
-            <a:r>
-              <a:rPr lang="en-US" dirty="0" err="1"/>
-              <a:t>selecionar</a:t>
-            </a:r>
-            <a:r>
-              <a:rPr lang="en-US" dirty="0"/>
-              <a:t> a </a:t>
-            </a:r>
-            <a:r>
-              <a:rPr lang="en-US" dirty="0" err="1"/>
-              <a:t>melhor</a:t>
-            </a:r>
-            <a:r>
-              <a:rPr lang="en-US" dirty="0"/>
-              <a:t> </a:t>
-            </a:r>
-            <a:r>
-              <a:rPr lang="en-US" dirty="0" err="1"/>
-              <a:t>resposta</a:t>
-            </a:r>
-            <a:r>
-              <a:rPr lang="en-US" dirty="0"/>
-              <a:t>.</a:t>
-            </a:r>
-          </a:p>
-          <a:p>
-            <a:r>
-              <a:rPr lang="en-US" dirty="0"/>
-              <a:t>No final, o </a:t>
-            </a:r>
-            <a:r>
-              <a:rPr lang="en-US" dirty="0" err="1"/>
-              <a:t>autor</a:t>
-            </a:r>
-            <a:r>
-              <a:rPr lang="en-US" dirty="0"/>
-              <a:t> </a:t>
-            </a:r>
-            <a:r>
-              <a:rPr lang="en-US" dirty="0" err="1"/>
-              <a:t>sugere</a:t>
-            </a:r>
-            <a:r>
-              <a:rPr lang="en-US" dirty="0"/>
-              <a:t> </a:t>
-            </a:r>
-            <a:r>
-              <a:rPr lang="en-US" dirty="0" err="1"/>
-              <a:t>como</a:t>
-            </a:r>
-            <a:r>
-              <a:rPr lang="en-US" dirty="0"/>
-              <a:t> </a:t>
-            </a:r>
-            <a:r>
-              <a:rPr lang="en-US" dirty="0" err="1"/>
-              <a:t>trabalho</a:t>
-            </a:r>
-            <a:r>
-              <a:rPr lang="en-US" dirty="0"/>
-              <a:t> </a:t>
-            </a:r>
-            <a:r>
-              <a:rPr lang="en-US" dirty="0" err="1"/>
-              <a:t>futuro</a:t>
-            </a:r>
-            <a:r>
-              <a:rPr lang="en-US" dirty="0"/>
-              <a:t> </a:t>
-            </a:r>
-            <a:r>
-              <a:rPr lang="en-US" dirty="0" err="1"/>
-              <a:t>verificar</a:t>
-            </a:r>
-            <a:r>
-              <a:rPr lang="en-US" dirty="0"/>
-              <a:t> o </a:t>
-            </a:r>
-            <a:r>
-              <a:rPr lang="en-US" dirty="0" err="1"/>
-              <a:t>comportamento</a:t>
-            </a:r>
-            <a:r>
-              <a:rPr lang="en-US" dirty="0"/>
-              <a:t> </a:t>
-            </a:r>
-            <a:r>
-              <a:rPr lang="en-US" dirty="0" err="1"/>
-              <a:t>utilizando</a:t>
-            </a:r>
-            <a:r>
-              <a:rPr lang="en-US" dirty="0"/>
-              <a:t> CNN e </a:t>
-            </a:r>
-            <a:r>
-              <a:rPr lang="en-US" dirty="0" err="1"/>
-              <a:t>outras</a:t>
-            </a:r>
-            <a:r>
-              <a:rPr lang="en-US" dirty="0"/>
-              <a:t> </a:t>
-            </a:r>
-            <a:r>
-              <a:rPr lang="en-US" dirty="0" err="1"/>
-              <a:t>técnicas</a:t>
-            </a:r>
-            <a:r>
-              <a:rPr lang="en-US" dirty="0"/>
-              <a:t>.</a:t>
-            </a:r>
-          </a:p>
-          <a:p>
-            <a:r>
-              <a:rPr lang="en-US" dirty="0"/>
-              <a:t>O dataset </a:t>
-            </a:r>
-            <a:r>
-              <a:rPr lang="en-US" dirty="0" err="1"/>
-              <a:t>é</a:t>
-            </a:r>
-            <a:r>
-              <a:rPr lang="en-US" dirty="0"/>
-              <a:t> </a:t>
-            </a:r>
-            <a:r>
-              <a:rPr lang="en-US" dirty="0" err="1"/>
-              <a:t>formado</a:t>
-            </a:r>
-            <a:r>
-              <a:rPr lang="en-US" dirty="0"/>
-              <a:t> </a:t>
-            </a:r>
-            <a:r>
-              <a:rPr lang="en-US" dirty="0" err="1"/>
-              <a:t>por</a:t>
-            </a:r>
-            <a:r>
-              <a:rPr lang="en-US" dirty="0"/>
-              <a:t> </a:t>
-            </a:r>
-            <a:r>
-              <a:rPr lang="en-US" dirty="0" err="1"/>
-              <a:t>questões</a:t>
-            </a:r>
-            <a:r>
-              <a:rPr lang="en-US" dirty="0"/>
-              <a:t> “How-to” de Python e SQL. São </a:t>
-            </a:r>
-            <a:r>
-              <a:rPr lang="en-US" dirty="0" err="1"/>
-              <a:t>questões</a:t>
-            </a:r>
-            <a:r>
-              <a:rPr lang="en-US" dirty="0"/>
-              <a:t> que </a:t>
-            </a:r>
-            <a:r>
-              <a:rPr lang="en-US" dirty="0" err="1"/>
-              <a:t>normalmente</a:t>
-            </a:r>
-            <a:r>
-              <a:rPr lang="en-US" dirty="0"/>
-              <a:t> a </a:t>
-            </a:r>
-            <a:r>
-              <a:rPr lang="en-US" dirty="0" err="1"/>
-              <a:t>resposta</a:t>
-            </a:r>
-            <a:r>
-              <a:rPr lang="en-US" dirty="0"/>
-              <a:t> </a:t>
-            </a:r>
-            <a:r>
-              <a:rPr lang="en-US" dirty="0" err="1"/>
-              <a:t>é</a:t>
-            </a:r>
-            <a:r>
-              <a:rPr lang="en-US" dirty="0"/>
-              <a:t> um code snippet. </a:t>
-            </a:r>
-            <a:r>
-              <a:rPr lang="en-US" dirty="0" err="1"/>
-              <a:t>Mais</a:t>
-            </a:r>
-            <a:r>
-              <a:rPr lang="en-US" dirty="0"/>
-              <a:t> de </a:t>
-            </a:r>
-            <a:r>
-              <a:rPr lang="en-US" dirty="0" err="1"/>
-              <a:t>uma</a:t>
-            </a:r>
-            <a:r>
-              <a:rPr lang="en-US" dirty="0"/>
-              <a:t> </a:t>
-            </a:r>
-            <a:r>
-              <a:rPr lang="en-US" dirty="0" err="1"/>
-              <a:t>resposta</a:t>
-            </a:r>
-            <a:r>
-              <a:rPr lang="en-US" dirty="0"/>
-              <a:t> </a:t>
-            </a:r>
-            <a:r>
-              <a:rPr lang="en-US" dirty="0" err="1"/>
-              <a:t>correta</a:t>
-            </a:r>
-            <a:r>
-              <a:rPr lang="en-US" dirty="0"/>
-              <a:t> </a:t>
-            </a:r>
-            <a:r>
-              <a:rPr lang="en-US" dirty="0" err="1"/>
-              <a:t>é</a:t>
-            </a:r>
-            <a:r>
-              <a:rPr lang="en-US" dirty="0"/>
-              <a:t> </a:t>
-            </a:r>
-            <a:r>
-              <a:rPr lang="en-US" dirty="0" err="1"/>
-              <a:t>possível</a:t>
-            </a:r>
-            <a:r>
-              <a:rPr lang="en-US" dirty="0"/>
-              <a:t> para </a:t>
-            </a:r>
-            <a:r>
-              <a:rPr lang="en-US" dirty="0" err="1"/>
-              <a:t>uma</a:t>
-            </a:r>
-            <a:r>
-              <a:rPr lang="en-US" dirty="0"/>
-              <a:t> </a:t>
-            </a:r>
-            <a:r>
-              <a:rPr lang="en-US" dirty="0" err="1"/>
-              <a:t>mesma</a:t>
-            </a:r>
-            <a:r>
-              <a:rPr lang="en-US" dirty="0"/>
-              <a:t> </a:t>
-            </a:r>
-            <a:r>
-              <a:rPr lang="en-US" dirty="0" err="1"/>
-              <a:t>pergunta</a:t>
-            </a:r>
-            <a:r>
-              <a:rPr lang="en-US" dirty="0"/>
-              <a:t>.</a:t>
-            </a:r>
-          </a:p>
-          <a:p>
-            <a:r>
-              <a:rPr lang="en-US" dirty="0" err="1"/>
-              <a:t>Após</a:t>
-            </a:r>
-            <a:r>
-              <a:rPr lang="en-US" dirty="0"/>
-              <a:t> </a:t>
-            </a:r>
-            <a:r>
-              <a:rPr lang="en-US" dirty="0" err="1"/>
-              <a:t>extrair</a:t>
-            </a:r>
-            <a:r>
-              <a:rPr lang="en-US" dirty="0"/>
-              <a:t> do stack over flow as </a:t>
-            </a:r>
-            <a:r>
-              <a:rPr lang="en-US" dirty="0" err="1"/>
-              <a:t>perguntas</a:t>
-            </a:r>
-            <a:r>
-              <a:rPr lang="en-US" dirty="0"/>
-              <a:t> “How-to” de Python, </a:t>
-            </a:r>
-            <a:r>
-              <a:rPr lang="en-US" dirty="0" err="1"/>
-              <a:t>por</a:t>
-            </a:r>
-            <a:r>
-              <a:rPr lang="en-US" dirty="0"/>
-              <a:t> </a:t>
-            </a:r>
-            <a:r>
-              <a:rPr lang="en-US" dirty="0" err="1"/>
-              <a:t>exemplo</a:t>
-            </a:r>
-            <a:r>
-              <a:rPr lang="en-US" dirty="0"/>
-              <a:t>, 3 </a:t>
-            </a:r>
-            <a:r>
-              <a:rPr lang="en-US" dirty="0" err="1"/>
-              <a:t>alunos</a:t>
-            </a:r>
-            <a:r>
-              <a:rPr lang="en-US" dirty="0"/>
-              <a:t> de </a:t>
-            </a:r>
-            <a:r>
-              <a:rPr lang="en-US" dirty="0" err="1"/>
-              <a:t>gradução</a:t>
-            </a:r>
-            <a:r>
-              <a:rPr lang="en-US" dirty="0"/>
-              <a:t> da </a:t>
-            </a:r>
-            <a:r>
-              <a:rPr lang="en-US" dirty="0" err="1"/>
-              <a:t>universidade</a:t>
-            </a:r>
-            <a:r>
-              <a:rPr lang="en-US" dirty="0"/>
-              <a:t> </a:t>
-            </a:r>
-            <a:r>
-              <a:rPr lang="en-US" dirty="0" err="1"/>
-              <a:t>marcaram</a:t>
-            </a:r>
-            <a:r>
-              <a:rPr lang="en-US" dirty="0"/>
-              <a:t> </a:t>
-            </a:r>
-            <a:r>
-              <a:rPr lang="en-US" dirty="0" err="1"/>
-              <a:t>quais</a:t>
-            </a:r>
-            <a:r>
-              <a:rPr lang="en-US" dirty="0"/>
-              <a:t> </a:t>
-            </a:r>
-            <a:r>
-              <a:rPr lang="en-US" dirty="0" err="1"/>
-              <a:t>respostas</a:t>
-            </a:r>
-            <a:r>
-              <a:rPr lang="en-US" dirty="0"/>
-              <a:t> </a:t>
-            </a:r>
-            <a:r>
-              <a:rPr lang="en-US" dirty="0" err="1"/>
-              <a:t>estavam</a:t>
-            </a:r>
-            <a:r>
-              <a:rPr lang="en-US" dirty="0"/>
-              <a:t> </a:t>
-            </a:r>
-            <a:r>
-              <a:rPr lang="en-US" dirty="0" err="1"/>
-              <a:t>certas</a:t>
-            </a:r>
-            <a:r>
-              <a:rPr lang="en-US" dirty="0"/>
-              <a:t> </a:t>
-            </a:r>
-            <a:r>
-              <a:rPr lang="en-US" dirty="0" err="1"/>
-              <a:t>ou</a:t>
-            </a:r>
-            <a:r>
-              <a:rPr lang="en-US" dirty="0"/>
-              <a:t> </a:t>
-            </a:r>
-            <a:r>
-              <a:rPr lang="en-US" dirty="0" err="1"/>
-              <a:t>erradas</a:t>
-            </a:r>
-            <a:r>
-              <a:rPr lang="en-US" dirty="0"/>
-              <a:t>. </a:t>
-            </a:r>
-            <a:r>
-              <a:rPr lang="en-US" dirty="0" err="1"/>
-              <a:t>Foram</a:t>
-            </a:r>
-            <a:r>
-              <a:rPr lang="en-US" dirty="0"/>
-              <a:t> </a:t>
-            </a:r>
-            <a:r>
-              <a:rPr lang="en-US" dirty="0" err="1"/>
-              <a:t>marcadas</a:t>
-            </a:r>
-            <a:r>
-              <a:rPr lang="en-US" dirty="0"/>
-              <a:t> um total de 4845 </a:t>
-            </a:r>
-            <a:r>
-              <a:rPr lang="en-US" dirty="0" err="1"/>
-              <a:t>respostas</a:t>
-            </a:r>
-            <a:r>
-              <a:rPr lang="en-US" dirty="0"/>
-              <a:t> para Python.</a:t>
-            </a:r>
           </a:p>
         </p:txBody>
       </p:sp>
     </p:spTree>
     <p:extLst>
       <p:ext uri="{BB962C8B-B14F-4D97-AF65-F5344CB8AC3E}">
-        <p14:creationId xmlns:p14="http://schemas.microsoft.com/office/powerpoint/2010/main" val="741761872"/>
-      </p:ext>
-    </p:extLst>
-  </p:cSld>
-  <p:clrMapOvr>
-    <a:masterClrMapping/>
-  </p:clrMapOvr>
-</p:sld>
-</file>
-
-<file path=ppt/slides/slide20.xml><?xml version="1.0" encoding="utf-8"?>
-<p:sld xmlns:a="http://schemas.openxmlformats.org/drawingml/2006/main" xmlns:r="http://schemas.openxmlformats.org/officeDocument/2006/relationships" xmlns:p="http://schemas.openxmlformats.org/presentationml/2006/main">
-  <p:cSld>
-    <p:spTree>
-      <p:nvGrpSpPr>
-        <p:cNvPr id="1" name=""/>
-        <p:cNvGrpSpPr/>
-        <p:nvPr/>
-      </p:nvGrpSpPr>
-      <p:grpSpPr>
-        <a:xfrm>
-          <a:off x="0" y="0"/>
-          <a:ext cx="0" cy="0"/>
-          <a:chOff x="0" y="0"/>
-          <a:chExt cx="0" cy="0"/>
-        </a:xfrm>
-      </p:grpSpPr>
-      <p:sp>
-        <p:nvSpPr>
-          <p:cNvPr id="2" name="Title 1">
-            <a:extLst>
-              <a:ext uri="{FF2B5EF4-FFF2-40B4-BE49-F238E27FC236}">
-                <a16:creationId xmlns:a16="http://schemas.microsoft.com/office/drawing/2014/main" id="{2E612492-6C94-804D-A74D-9CDC207A2397}"/>
-              </a:ext>
-            </a:extLst>
-          </p:cNvPr>
-          <p:cNvSpPr>
-            <a:spLocks noGrp="1"/>
-          </p:cNvSpPr>
-          <p:nvPr>
-            <p:ph type="title"/>
-          </p:nvPr>
-        </p:nvSpPr>
-        <p:spPr/>
-        <p:txBody>
-          <a:bodyPr/>
-          <a:lstStyle/>
-          <a:p>
-            <a:r>
-              <a:rPr lang="en-US" dirty="0" err="1"/>
-              <a:t>Comentários</a:t>
-            </a:r>
-            <a:r>
-              <a:rPr lang="en-US" dirty="0"/>
-              <a:t> </a:t>
-            </a:r>
-            <a:r>
-              <a:rPr lang="en-US" dirty="0" err="1"/>
-              <a:t>sobre</a:t>
-            </a:r>
-            <a:r>
-              <a:rPr lang="en-US" dirty="0"/>
-              <a:t> </a:t>
-            </a:r>
-            <a:r>
-              <a:rPr lang="en-US" dirty="0" err="1"/>
-              <a:t>os</a:t>
-            </a:r>
-            <a:r>
-              <a:rPr lang="en-US" dirty="0"/>
-              <a:t> </a:t>
-            </a:r>
-            <a:r>
-              <a:rPr lang="en-US" dirty="0" err="1"/>
-              <a:t>resultados</a:t>
-            </a:r>
-            <a:r>
-              <a:rPr lang="en-US" dirty="0"/>
-              <a:t> </a:t>
-            </a:r>
-            <a:r>
-              <a:rPr lang="en-US" dirty="0" err="1"/>
-              <a:t>iniciais</a:t>
-            </a:r>
-            <a:endParaRPr lang="en-US" dirty="0"/>
-          </a:p>
-        </p:txBody>
-      </p:sp>
-      <p:graphicFrame>
-        <p:nvGraphicFramePr>
-          <p:cNvPr id="5" name="Content Placeholder 4">
-            <a:extLst>
-              <a:ext uri="{FF2B5EF4-FFF2-40B4-BE49-F238E27FC236}">
-                <a16:creationId xmlns:a16="http://schemas.microsoft.com/office/drawing/2014/main" id="{539FED6B-E1C4-A240-81EF-C31142E81902}"/>
-              </a:ext>
-            </a:extLst>
-          </p:cNvPr>
-          <p:cNvGraphicFramePr>
-            <a:graphicFrameLocks noGrp="1"/>
-          </p:cNvGraphicFramePr>
-          <p:nvPr>
-            <p:ph idx="1"/>
-          </p:nvPr>
-        </p:nvGraphicFramePr>
-        <p:xfrm>
-          <a:off x="838200" y="1825625"/>
-          <a:ext cx="10515600" cy="1930400"/>
-        </p:xfrm>
-        <a:graphic>
-          <a:graphicData uri="http://schemas.openxmlformats.org/drawingml/2006/table">
-            <a:tbl>
-              <a:tblPr firstRow="1" bandRow="1">
-                <a:tableStyleId>{8799B23B-EC83-4686-B30A-512413B5E67A}</a:tableStyleId>
-              </a:tblPr>
-              <a:tblGrid>
-                <a:gridCol w="3505200">
-                  <a:extLst>
-                    <a:ext uri="{9D8B030D-6E8A-4147-A177-3AD203B41FA5}">
-                      <a16:colId xmlns:a16="http://schemas.microsoft.com/office/drawing/2014/main" val="4038344632"/>
-                    </a:ext>
-                  </a:extLst>
-                </a:gridCol>
-                <a:gridCol w="3505200">
-                  <a:extLst>
-                    <a:ext uri="{9D8B030D-6E8A-4147-A177-3AD203B41FA5}">
-                      <a16:colId xmlns:a16="http://schemas.microsoft.com/office/drawing/2014/main" val="1313495452"/>
-                    </a:ext>
-                  </a:extLst>
-                </a:gridCol>
-                <a:gridCol w="3505200">
-                  <a:extLst>
-                    <a:ext uri="{9D8B030D-6E8A-4147-A177-3AD203B41FA5}">
-                      <a16:colId xmlns:a16="http://schemas.microsoft.com/office/drawing/2014/main" val="1208455611"/>
-                    </a:ext>
-                  </a:extLst>
-                </a:gridCol>
-              </a:tblGrid>
-              <a:tr h="370840">
-                <a:tc>
-                  <a:txBody>
-                    <a:bodyPr/>
-                    <a:lstStyle/>
-                    <a:p>
-                      <a:endParaRPr lang="en-US" dirty="0"/>
-                    </a:p>
-                  </a:txBody>
-                  <a:tcPr/>
-                </a:tc>
-                <a:tc>
-                  <a:txBody>
-                    <a:bodyPr/>
-                    <a:lstStyle/>
-                    <a:p>
-                      <a:r>
-                        <a:rPr lang="en-US" dirty="0" err="1"/>
-                        <a:t>Arquitetura</a:t>
-                      </a:r>
-                      <a:r>
-                        <a:rPr lang="en-US" dirty="0"/>
-                        <a:t> LSTM (Paper: </a:t>
-                      </a:r>
-                      <a:r>
-                        <a:rPr lang="en-US" dirty="0" err="1"/>
-                        <a:t>StaQC</a:t>
-                      </a:r>
-                      <a:r>
-                        <a:rPr lang="en-US" dirty="0"/>
-                        <a:t>: A Systematically Mined Question-Code Dataset from Stack Overflow)</a:t>
-                      </a:r>
-                    </a:p>
-                  </a:txBody>
-                  <a:tcPr/>
-                </a:tc>
-                <a:tc>
-                  <a:txBody>
-                    <a:bodyPr/>
-                    <a:lstStyle/>
-                    <a:p>
-                      <a:r>
-                        <a:rPr lang="en-US" dirty="0" err="1">
-                          <a:solidFill>
-                            <a:srgbClr val="FF0000"/>
-                          </a:solidFill>
-                        </a:rPr>
-                        <a:t>Arquitetura</a:t>
-                      </a:r>
-                      <a:r>
-                        <a:rPr lang="en-US" dirty="0">
-                          <a:solidFill>
-                            <a:srgbClr val="FF0000"/>
-                          </a:solidFill>
-                        </a:rPr>
-                        <a:t> LSTM+CNN (Paper: Applying Deep Learning to Answer Selection: A Study and An Open Task)</a:t>
-                      </a:r>
-                    </a:p>
-                  </a:txBody>
-                  <a:tcPr/>
-                </a:tc>
-                <a:extLst>
-                  <a:ext uri="{0D108BD9-81ED-4DB2-BD59-A6C34878D82A}">
-                    <a16:rowId xmlns:a16="http://schemas.microsoft.com/office/drawing/2014/main" val="2491791507"/>
-                  </a:ext>
-                </a:extLst>
-              </a:tr>
-              <a:tr h="370840">
-                <a:tc>
-                  <a:txBody>
-                    <a:bodyPr/>
-                    <a:lstStyle/>
-                    <a:p>
-                      <a:r>
-                        <a:rPr lang="en-US" dirty="0" err="1"/>
-                        <a:t>Precisão</a:t>
-                      </a:r>
-                      <a:endParaRPr lang="en-US" dirty="0"/>
-                    </a:p>
-                  </a:txBody>
-                  <a:tcPr/>
-                </a:tc>
-                <a:tc>
-                  <a:txBody>
-                    <a:bodyPr/>
-                    <a:lstStyle/>
-                    <a:p>
-                      <a:r>
-                        <a:rPr lang="en-US" dirty="0"/>
-                        <a:t>56%</a:t>
-                      </a:r>
-                    </a:p>
-                  </a:txBody>
-                  <a:tcPr/>
-                </a:tc>
-                <a:tc>
-                  <a:txBody>
-                    <a:bodyPr/>
-                    <a:lstStyle/>
-                    <a:p>
-                      <a:r>
-                        <a:rPr lang="en-US" dirty="0">
-                          <a:solidFill>
-                            <a:srgbClr val="FF0000"/>
-                          </a:solidFill>
-                        </a:rPr>
-                        <a:t>4%</a:t>
-                      </a:r>
-                    </a:p>
-                  </a:txBody>
-                  <a:tcPr/>
-                </a:tc>
-                <a:extLst>
-                  <a:ext uri="{0D108BD9-81ED-4DB2-BD59-A6C34878D82A}">
-                    <a16:rowId xmlns:a16="http://schemas.microsoft.com/office/drawing/2014/main" val="1119549803"/>
-                  </a:ext>
-                </a:extLst>
-              </a:tr>
-              <a:tr h="370840">
-                <a:tc>
-                  <a:txBody>
-                    <a:bodyPr/>
-                    <a:lstStyle/>
-                    <a:p>
-                      <a:r>
-                        <a:rPr lang="en-US" dirty="0" err="1"/>
-                        <a:t>Amostras</a:t>
-                      </a:r>
-                      <a:endParaRPr lang="en-US" dirty="0"/>
-                    </a:p>
-                  </a:txBody>
-                  <a:tcPr/>
-                </a:tc>
-                <a:tc>
-                  <a:txBody>
-                    <a:bodyPr/>
-                    <a:lstStyle/>
-                    <a:p>
-                      <a:r>
-                        <a:rPr lang="en-US" dirty="0"/>
-                        <a:t>4848</a:t>
-                      </a:r>
-                    </a:p>
-                  </a:txBody>
-                  <a:tcPr/>
-                </a:tc>
-                <a:tc>
-                  <a:txBody>
-                    <a:bodyPr/>
-                    <a:lstStyle/>
-                    <a:p>
-                      <a:r>
-                        <a:rPr lang="en-US" dirty="0">
-                          <a:solidFill>
-                            <a:srgbClr val="FF0000"/>
-                          </a:solidFill>
-                        </a:rPr>
-                        <a:t>2145</a:t>
-                      </a:r>
-                    </a:p>
-                  </a:txBody>
-                  <a:tcPr/>
-                </a:tc>
-                <a:extLst>
-                  <a:ext uri="{0D108BD9-81ED-4DB2-BD59-A6C34878D82A}">
-                    <a16:rowId xmlns:a16="http://schemas.microsoft.com/office/drawing/2014/main" val="3834603138"/>
-                  </a:ext>
-                </a:extLst>
-              </a:tr>
-            </a:tbl>
-          </a:graphicData>
-        </a:graphic>
-      </p:graphicFrame>
-      <p:sp>
-        <p:nvSpPr>
-          <p:cNvPr id="4" name="TextBox 3">
-            <a:extLst>
-              <a:ext uri="{FF2B5EF4-FFF2-40B4-BE49-F238E27FC236}">
-                <a16:creationId xmlns:a16="http://schemas.microsoft.com/office/drawing/2014/main" id="{C269A1BF-BF3F-E142-8022-788026B00D87}"/>
-              </a:ext>
-            </a:extLst>
-          </p:cNvPr>
-          <p:cNvSpPr txBox="1"/>
-          <p:nvPr/>
-        </p:nvSpPr>
-        <p:spPr>
-          <a:xfrm>
-            <a:off x="838200" y="3962400"/>
-            <a:ext cx="10515600" cy="923330"/>
-          </a:xfrm>
-          <a:prstGeom prst="rect">
-            <a:avLst/>
-          </a:prstGeom>
-          <a:noFill/>
-        </p:spPr>
-        <p:txBody>
-          <a:bodyPr wrap="square" rtlCol="0">
-            <a:spAutoFit/>
-          </a:bodyPr>
-          <a:lstStyle/>
-          <a:p>
-            <a:pPr marL="285750" indent="-285750">
-              <a:buFont typeface="Arial" panose="020B0604020202020204" pitchFamily="34" charset="0"/>
-              <a:buChar char="•"/>
-            </a:pPr>
-            <a:r>
-              <a:rPr lang="en-US" dirty="0"/>
-              <a:t>O </a:t>
-            </a:r>
-            <a:r>
-              <a:rPr lang="en-US" dirty="0" err="1"/>
-              <a:t>intuito</a:t>
-            </a:r>
-            <a:r>
-              <a:rPr lang="en-US" dirty="0"/>
-              <a:t> </a:t>
-            </a:r>
-            <a:r>
-              <a:rPr lang="en-US" dirty="0" err="1"/>
-              <a:t>é</a:t>
-            </a:r>
-            <a:r>
-              <a:rPr lang="en-US" dirty="0"/>
-              <a:t> </a:t>
-            </a:r>
-            <a:r>
-              <a:rPr lang="en-US" dirty="0" err="1"/>
-              <a:t>voltar</a:t>
-            </a:r>
-            <a:r>
-              <a:rPr lang="en-US" dirty="0"/>
-              <a:t> a utilizer a </a:t>
-            </a:r>
-            <a:r>
-              <a:rPr lang="en-US" dirty="0" err="1"/>
-              <a:t>função</a:t>
-            </a:r>
-            <a:r>
-              <a:rPr lang="en-US" dirty="0"/>
-              <a:t> </a:t>
-            </a:r>
-            <a:r>
-              <a:rPr lang="en-US" dirty="0" err="1"/>
-              <a:t>customizada</a:t>
-            </a:r>
-            <a:r>
-              <a:rPr lang="en-US" dirty="0"/>
-              <a:t> para </a:t>
-            </a:r>
-            <a:r>
-              <a:rPr lang="en-US" dirty="0" err="1"/>
-              <a:t>verificar</a:t>
-            </a:r>
-            <a:r>
-              <a:rPr lang="en-US" dirty="0"/>
-              <a:t> se a </a:t>
-            </a:r>
-            <a:r>
-              <a:rPr lang="en-US" dirty="0" err="1"/>
-              <a:t>precisão</a:t>
-            </a:r>
-            <a:r>
-              <a:rPr lang="en-US" dirty="0"/>
-              <a:t> </a:t>
-            </a:r>
-            <a:r>
-              <a:rPr lang="en-US" dirty="0" err="1"/>
-              <a:t>melhora</a:t>
-            </a:r>
-            <a:r>
-              <a:rPr lang="en-US" dirty="0"/>
-              <a:t>. A </a:t>
-            </a:r>
-            <a:r>
-              <a:rPr lang="en-US" dirty="0" err="1"/>
-              <a:t>explicação</a:t>
-            </a:r>
-            <a:r>
-              <a:rPr lang="en-US" dirty="0"/>
-              <a:t> do </a:t>
-            </a:r>
-            <a:r>
-              <a:rPr lang="en-US" dirty="0" err="1"/>
-              <a:t>motivo</a:t>
-            </a:r>
-            <a:r>
-              <a:rPr lang="en-US" dirty="0"/>
-              <a:t> de utilizer </a:t>
-            </a:r>
-            <a:r>
-              <a:rPr lang="en-US" dirty="0" err="1"/>
-              <a:t>uma</a:t>
-            </a:r>
-            <a:r>
-              <a:rPr lang="en-US" dirty="0"/>
-              <a:t> </a:t>
-            </a:r>
-            <a:r>
-              <a:rPr lang="en-US" dirty="0" err="1"/>
-              <a:t>função</a:t>
-            </a:r>
-            <a:r>
-              <a:rPr lang="en-US" dirty="0"/>
-              <a:t> </a:t>
-            </a:r>
-            <a:r>
-              <a:rPr lang="en-US" dirty="0" err="1"/>
-              <a:t>customizada</a:t>
-            </a:r>
-            <a:r>
-              <a:rPr lang="en-US" dirty="0"/>
-              <a:t> </a:t>
-            </a:r>
-            <a:r>
-              <a:rPr lang="en-US" dirty="0" err="1"/>
-              <a:t>está</a:t>
-            </a:r>
-            <a:r>
-              <a:rPr lang="en-US" dirty="0"/>
-              <a:t> no blog https://</a:t>
-            </a:r>
-            <a:r>
-              <a:rPr lang="en-US" dirty="0" err="1"/>
-              <a:t>codekansas.github.io</a:t>
-            </a:r>
-            <a:r>
-              <a:rPr lang="en-US" dirty="0"/>
-              <a:t>/</a:t>
-            </a:r>
-            <a:r>
-              <a:rPr lang="en-US" dirty="0" err="1"/>
-              <a:t>language.html</a:t>
-            </a:r>
-            <a:endParaRPr lang="en-US" dirty="0"/>
-          </a:p>
-          <a:p>
-            <a:pPr marL="285750" indent="-285750">
-              <a:buFont typeface="Arial" panose="020B0604020202020204" pitchFamily="34" charset="0"/>
-              <a:buChar char="•"/>
-            </a:pPr>
-            <a:endParaRPr lang="en-US" dirty="0"/>
-          </a:p>
-        </p:txBody>
-      </p:sp>
-    </p:spTree>
-    <p:extLst>
-      <p:ext uri="{BB962C8B-B14F-4D97-AF65-F5344CB8AC3E}">
-        <p14:creationId xmlns:p14="http://schemas.microsoft.com/office/powerpoint/2010/main" val="3302351604"/>
+        <p14:creationId xmlns:p14="http://schemas.microsoft.com/office/powerpoint/2010/main" val="2341116043"/>
       </p:ext>
     </p:extLst>
   </p:cSld>
@@ -9143,7 +9793,7 @@
             <p:ph idx="1"/>
             <p:extLst>
               <p:ext uri="{D42A27DB-BD31-4B8C-83A1-F6EECF244321}">
-                <p14:modId xmlns:p14="http://schemas.microsoft.com/office/powerpoint/2010/main" val="2884136761"/>
+                <p14:modId xmlns:p14="http://schemas.microsoft.com/office/powerpoint/2010/main" val="2938082284"/>
               </p:ext>
             </p:extLst>
           </p:nvPr>
@@ -9655,7 +10305,7 @@
                       </a:r>
                       <a:r>
                         <a:rPr lang="en-US" u="sng" dirty="0"/>
-                        <a:t> et all</a:t>
+                        <a:t> et al</a:t>
                       </a:r>
                       <a:r>
                         <a:rPr lang="en-US" dirty="0"/>

</xml_diff>